<commit_message>
Live Lecture 1 updates
</commit_message>
<xml_diff>
--- a/lectures/lecture-01/Lecture-Live/Lecture 01 - Lecture.pptx
+++ b/lectures/lecture-01/Lecture-Live/Lecture 01 - Lecture.pptx
@@ -142,6 +142,614 @@
     </p:ext>
   </p:extLst>
 </p:presentation>
+</file>
+
+<file path=ppt/ink/ink1.xml><?xml version="1.0" encoding="utf-8"?>
+<inkml:ink xmlns:inkml="http://www.w3.org/2003/InkML">
+  <inkml:definitions>
+    <inkml:context xml:id="ctx0">
+      <inkml:inkSource xml:id="inkSrc0">
+        <inkml:traceFormat>
+          <inkml:channel name="X" type="integer" min="-2.14748E9" max="2.14748E9" units="cm"/>
+          <inkml:channel name="Y" type="integer" min="-2.14748E9" max="2.14748E9" units="cm"/>
+          <inkml:channel name="F" type="integer" max="32767" units="dev"/>
+          <inkml:channel name="OA" type="integer" max="360" units="deg"/>
+          <inkml:channel name="OE" type="integer" max="90" units="deg"/>
+        </inkml:traceFormat>
+        <inkml:channelProperties>
+          <inkml:channelProperty channel="X" name="resolution" value="1000" units="1/cm"/>
+          <inkml:channelProperty channel="Y" name="resolution" value="1000" units="1/cm"/>
+          <inkml:channelProperty channel="F" name="resolution" value="0" units="1/dev"/>
+          <inkml:channelProperty channel="OA" name="resolution" value="1000" units="1/deg"/>
+          <inkml:channelProperty channel="OE" name="resolution" value="1000" units="1/deg"/>
+        </inkml:channelProperties>
+      </inkml:inkSource>
+      <inkml:timestamp xml:id="ts0" timeString="2021-03-29T19:01:57.125"/>
+    </inkml:context>
+    <inkml:brush xml:id="br0">
+      <inkml:brushProperty name="width" value="0.05" units="cm"/>
+      <inkml:brushProperty name="height" value="0.05" units="cm"/>
+      <inkml:brushProperty name="color" value="#E71224"/>
+    </inkml:brush>
+  </inkml:definitions>
+  <inkml:trace contextRef="#ctx0" brushRef="#br0">48 1 1840 0 0,'-17'10'231'0'0,"12"-7"762"0"0,-21 7 11650 0 0,26-10-12543 0 0,4 6 1412 0 0,6 2-726 0 0,-4-6-598 0 0,0 1 1 0 0,0-2 0 0 0,0 1-1 0 0,0-1 1 0 0,1 0 0 0 0,9 1-1 0 0,18 2 362 0 0,-12 0-184 0 0,0-2-1 0 0,35 0 1 0 0,-28-1-101 0 0,449-6 2262 0 0,-142-2-1544 0 0,-105-2-168 0 0,0 1-12 0 0,-33-2 110 0 0,1-1-28 0 0,96 19-350 0 0,44 36 290 0 0,-255-30-377 0 0,49 3-61 0 0,-112-15-225 0 0,1-2 1 0 0,-1-1 0 0 0,0 0-1 0 0,28-6 1 0 0,-43 5-90 0 0,-3 2-50 0 0,5-5 52 0 0,-7 4-115 0 0</inkml:trace>
+</inkml:ink>
+</file>
+
+<file path=ppt/ink/ink10.xml><?xml version="1.0" encoding="utf-8"?>
+<inkml:ink xmlns:inkml="http://www.w3.org/2003/InkML">
+  <inkml:definitions>
+    <inkml:context xml:id="ctx0">
+      <inkml:inkSource xml:id="inkSrc0">
+        <inkml:traceFormat>
+          <inkml:channel name="X" type="integer" min="-2.14748E9" max="2.14748E9" units="cm"/>
+          <inkml:channel name="Y" type="integer" min="-2.14748E9" max="2.14748E9" units="cm"/>
+          <inkml:channel name="F" type="integer" max="32767" units="dev"/>
+          <inkml:channel name="OA" type="integer" max="360" units="deg"/>
+          <inkml:channel name="OE" type="integer" max="90" units="deg"/>
+        </inkml:traceFormat>
+        <inkml:channelProperties>
+          <inkml:channelProperty channel="X" name="resolution" value="1000" units="1/cm"/>
+          <inkml:channelProperty channel="Y" name="resolution" value="1000" units="1/cm"/>
+          <inkml:channelProperty channel="F" name="resolution" value="0" units="1/dev"/>
+          <inkml:channelProperty channel="OA" name="resolution" value="1000" units="1/deg"/>
+          <inkml:channelProperty channel="OE" name="resolution" value="1000" units="1/deg"/>
+        </inkml:channelProperties>
+      </inkml:inkSource>
+      <inkml:timestamp xml:id="ts0" timeString="2021-03-29T19:02:13.737"/>
+    </inkml:context>
+    <inkml:brush xml:id="br0">
+      <inkml:brushProperty name="width" value="0.05" units="cm"/>
+      <inkml:brushProperty name="height" value="0.05" units="cm"/>
+      <inkml:brushProperty name="color" value="#E71224"/>
+    </inkml:brush>
+  </inkml:definitions>
+  <inkml:trace contextRef="#ctx0" brushRef="#br0">16 300 18111 0 0,'0'0'1639'0'0,"3"-8"-1318"0"0,-1 3-124 0 0,0 1 0 0 0,0-1 0 0 0,1 1 0 0 0,0-1 0 0 0,0 1 0 0 0,0 0 0 0 0,5-4 0 0 0,13-21 1445 0 0,7-17-218 0 0,-13 21-1139 0 0,-1-1 0 0 0,13-31-1 0 0,-25 53-277 0 0,-1 0-1 0 0,0-1 1 0 0,0 1-1 0 0,-1-1 1 0 0,1 1 0 0 0,-1-1-1 0 0,0 1 1 0 0,-2-10-1 0 0,2 13 28 0 0,0 0-1 0 0,0 0 1 0 0,-1 0 0 0 0,1 0-1 0 0,0-1 1 0 0,-1 1 0 0 0,1 0-1 0 0,-1 0 1 0 0,1 0 0 0 0,-1 0-1 0 0,0 0 1 0 0,1 0 0 0 0,-1 0-1 0 0,0 0 1 0 0,-1-1 0 0 0,1 2 19 0 0,0-1 1 0 0,0 1-1 0 0,0 0 1 0 0,0-1-1 0 0,0 1 1 0 0,1 0 0 0 0,-1 0-1 0 0,0 0 1 0 0,0 0-1 0 0,0 0 1 0 0,0 0-1 0 0,0 0 1 0 0,0 0-1 0 0,0 0 1 0 0,0 0-1 0 0,0 0 1 0 0,1 1 0 0 0,-1-1-1 0 0,0 0 1 0 0,0 1-1 0 0,0-1 1 0 0,0 1-1 0 0,-1 0 1 0 0,-5 3-3 0 0,1 1 1 0 0,-1 0 0 0 0,1 0-1 0 0,0 1 1 0 0,0-1 0 0 0,0 1-1 0 0,1 1 1 0 0,0-1 0 0 0,-6 12-1 0 0,1-3 185 0 0,2 1-1 0 0,0 0 0 0 0,-7 22 0 0 0,12-28-174 0 0,0 0 0 0 0,0 0 0 0 0,1-1 0 0 0,0 2 0 0 0,1-1 0 0 0,0 19 0 0 0,1-26-57 0 0,0 1 1 0 0,1 0-1 0 0,-1 0 1 0 0,1-1-1 0 0,0 1 0 0 0,0-1 1 0 0,1 1-1 0 0,-1-1 1 0 0,1 1-1 0 0,-1-1 1 0 0,1 0-1 0 0,0 0 0 0 0,0 0 1 0 0,1 0-1 0 0,-1 0 1 0 0,1 0-1 0 0,-1-1 0 0 0,1 1 1 0 0,0-1-1 0 0,0 0 1 0 0,6 4-1 0 0,-4-3-227 0 0,1-1 0 0 0,-1 1-1 0 0,1-1 1 0 0,0-1 0 0 0,-1 1 0 0 0,1-1 0 0 0,0 0-1 0 0,0 0 1 0 0,0 0 0 0 0,0-1 0 0 0,12-1 0 0 0,7-2-1195 0 0</inkml:trace>
+</inkml:ink>
+</file>
+
+<file path=ppt/ink/ink11.xml><?xml version="1.0" encoding="utf-8"?>
+<inkml:ink xmlns:inkml="http://www.w3.org/2003/InkML">
+  <inkml:definitions>
+    <inkml:context xml:id="ctx0">
+      <inkml:inkSource xml:id="inkSrc0">
+        <inkml:traceFormat>
+          <inkml:channel name="X" type="integer" min="-2.14748E9" max="2.14748E9" units="cm"/>
+          <inkml:channel name="Y" type="integer" min="-2.14748E9" max="2.14748E9" units="cm"/>
+          <inkml:channel name="F" type="integer" max="32767" units="dev"/>
+          <inkml:channel name="OA" type="integer" max="360" units="deg"/>
+          <inkml:channel name="OE" type="integer" max="90" units="deg"/>
+        </inkml:traceFormat>
+        <inkml:channelProperties>
+          <inkml:channelProperty channel="X" name="resolution" value="1000" units="1/cm"/>
+          <inkml:channelProperty channel="Y" name="resolution" value="1000" units="1/cm"/>
+          <inkml:channelProperty channel="F" name="resolution" value="0" units="1/dev"/>
+          <inkml:channelProperty channel="OA" name="resolution" value="1000" units="1/deg"/>
+          <inkml:channelProperty channel="OE" name="resolution" value="1000" units="1/deg"/>
+        </inkml:channelProperties>
+      </inkml:inkSource>
+      <inkml:timestamp xml:id="ts0" timeString="2021-03-29T19:02:14.073"/>
+    </inkml:context>
+    <inkml:brush xml:id="br0">
+      <inkml:brushProperty name="width" value="0.05" units="cm"/>
+      <inkml:brushProperty name="height" value="0.05" units="cm"/>
+      <inkml:brushProperty name="color" value="#E71224"/>
+    </inkml:brush>
+  </inkml:definitions>
+  <inkml:trace contextRef="#ctx0" brushRef="#br0">118 3 22775 0 0,'-2'0'137'0'0,"-1"-1"51"0"0,1 1-1 0 0,-1-1 0 0 0,1 1 0 0 0,-1 0 0 0 0,0 0 1 0 0,1 0-1 0 0,-1 0 0 0 0,1 0 0 0 0,-1 1 0 0 0,1-1 1 0 0,-1 1-1 0 0,-5 2 3194 0 0,28 2-2597 0 0,-17-5-713 0 0,9 2 79 0 0,0 1 0 0 0,-1 0 0 0 0,1 0 0 0 0,12 6 1 0 0,-22-8-133 0 0,1 1 0 0 0,-1-1 0 0 0,1 1 0 0 0,-1 0 0 0 0,1-1 0 0 0,-1 1 0 0 0,0 0 0 0 0,0 0 0 0 0,3 5 0 0 0,-4-6-11 0 0,0 1 1 0 0,0-1 0 0 0,0 1-1 0 0,-1 0 1 0 0,1-1 0 0 0,0 1 0 0 0,-1 0-1 0 0,0 0 1 0 0,1 0 0 0 0,-1-1-1 0 0,0 1 1 0 0,0 0 0 0 0,0 0 0 0 0,0 0-1 0 0,0-1 1 0 0,0 1 0 0 0,-1 2-1 0 0,-2 5 16 0 0,0 0-1 0 0,0 0 0 0 0,-1-1 0 0 0,0 1 1 0 0,-1-1-1 0 0,0 0 0 0 0,-9 12 0 0 0,3-7-141 0 0,-1 1 0 0 0,0-1 0 0 0,-16 12 0 0 0,-13 7-1772 0 0,11-12-5387 0 0,3-4-1759 0 0</inkml:trace>
+</inkml:ink>
+</file>
+
+<file path=ppt/ink/ink12.xml><?xml version="1.0" encoding="utf-8"?>
+<inkml:ink xmlns:inkml="http://www.w3.org/2003/InkML">
+  <inkml:definitions>
+    <inkml:context xml:id="ctx0">
+      <inkml:inkSource xml:id="inkSrc0">
+        <inkml:traceFormat>
+          <inkml:channel name="X" type="integer" min="-2.14748E9" max="2.14748E9" units="cm"/>
+          <inkml:channel name="Y" type="integer" min="-2.14748E9" max="2.14748E9" units="cm"/>
+          <inkml:channel name="F" type="integer" max="32767" units="dev"/>
+          <inkml:channel name="OA" type="integer" max="360" units="deg"/>
+          <inkml:channel name="OE" type="integer" max="90" units="deg"/>
+        </inkml:traceFormat>
+        <inkml:channelProperties>
+          <inkml:channelProperty channel="X" name="resolution" value="1000" units="1/cm"/>
+          <inkml:channelProperty channel="Y" name="resolution" value="1000" units="1/cm"/>
+          <inkml:channelProperty channel="F" name="resolution" value="0" units="1/dev"/>
+          <inkml:channelProperty channel="OA" name="resolution" value="1000" units="1/deg"/>
+          <inkml:channelProperty channel="OE" name="resolution" value="1000" units="1/deg"/>
+        </inkml:channelProperties>
+      </inkml:inkSource>
+      <inkml:timestamp xml:id="ts0" timeString="2021-03-29T19:02:14.422"/>
+    </inkml:context>
+    <inkml:brush xml:id="br0">
+      <inkml:brushProperty name="width" value="0.05" units="cm"/>
+      <inkml:brushProperty name="height" value="0.05" units="cm"/>
+      <inkml:brushProperty name="color" value="#E71224"/>
+    </inkml:brush>
+  </inkml:definitions>
+  <inkml:trace contextRef="#ctx0" brushRef="#br0">163 0 3224 0 0,'0'0'8440'0'0,"-4"1"-5798"0"0,-4 3-1200 0 0,0 0-1 0 0,0 1 1 0 0,1 0-1 0 0,-11 9 1 0 0,8-5-486 0 0,1 0 0 0 0,-14 18-1 0 0,12-11-626 0 0,0 0-1 0 0,1 0 1 0 0,2 0-1 0 0,-12 27 0 0 0,19-38-339 0 0,-1 0 0 0 0,1 0-1 0 0,0 0 1 0 0,0 0 0 0 0,0 0-1 0 0,1 1 1 0 0,0-1 0 0 0,0 0-1 0 0,0 0 1 0 0,0 0 0 0 0,2 8-1 0 0,-1-11 19 0 0,-1 0 0 0 0,1-1-1 0 0,0 1 1 0 0,-1 0-1 0 0,1-1 1 0 0,0 1 0 0 0,0 0-1 0 0,0-1 1 0 0,0 1 0 0 0,0-1-1 0 0,0 0 1 0 0,0 1-1 0 0,1-1 1 0 0,-1 0 0 0 0,1 0-1 0 0,-1 1 1 0 0,1-1 0 0 0,-1 0-1 0 0,1-1 1 0 0,-1 1-1 0 0,1 0 1 0 0,0 0 0 0 0,-1-1-1 0 0,1 1 1 0 0,0-1 0 0 0,0 1-1 0 0,-1-1 1 0 0,1 0-1 0 0,0 0 1 0 0,0 0 0 0 0,0 0-1 0 0,0 0 1 0 0,-1 0 0 0 0,1 0-1 0 0,3-1 1 0 0,29-7-2163 0 0,-1-1 1 0 0,46-19-1 0 0,-31 10-1646 0 0,-20 8-457 0 0,-6 0-795 0 0</inkml:trace>
+</inkml:ink>
+</file>
+
+<file path=ppt/ink/ink13.xml><?xml version="1.0" encoding="utf-8"?>
+<inkml:ink xmlns:inkml="http://www.w3.org/2003/InkML">
+  <inkml:definitions>
+    <inkml:context xml:id="ctx0">
+      <inkml:inkSource xml:id="inkSrc0">
+        <inkml:traceFormat>
+          <inkml:channel name="X" type="integer" min="-2.14748E9" max="2.14748E9" units="cm"/>
+          <inkml:channel name="Y" type="integer" min="-2.14748E9" max="2.14748E9" units="cm"/>
+          <inkml:channel name="F" type="integer" max="32767" units="dev"/>
+          <inkml:channel name="OA" type="integer" max="360" units="deg"/>
+          <inkml:channel name="OE" type="integer" max="90" units="deg"/>
+        </inkml:traceFormat>
+        <inkml:channelProperties>
+          <inkml:channelProperty channel="X" name="resolution" value="1000" units="1/cm"/>
+          <inkml:channelProperty channel="Y" name="resolution" value="1000" units="1/cm"/>
+          <inkml:channelProperty channel="F" name="resolution" value="0" units="1/dev"/>
+          <inkml:channelProperty channel="OA" name="resolution" value="1000" units="1/deg"/>
+          <inkml:channelProperty channel="OE" name="resolution" value="1000" units="1/deg"/>
+        </inkml:channelProperties>
+      </inkml:inkSource>
+      <inkml:timestamp xml:id="ts0" timeString="2021-03-29T19:02:14.771"/>
+    </inkml:context>
+    <inkml:brush xml:id="br0">
+      <inkml:brushProperty name="width" value="0.05" units="cm"/>
+      <inkml:brushProperty name="height" value="0.05" units="cm"/>
+      <inkml:brushProperty name="color" value="#E71224"/>
+    </inkml:brush>
+  </inkml:definitions>
+  <inkml:trace contextRef="#ctx0" brushRef="#br0">245 34 2760 0 0,'0'-18'3166'0'0,"-1"17"-2676"0"0,1 1-1 0 0,0-1 0 0 0,-1 0 1 0 0,1 0-1 0 0,0 1 0 0 0,-1-1 0 0 0,1 0 1 0 0,-1 1-1 0 0,1-1 0 0 0,-1 0 0 0 0,0 1 1 0 0,1-1-1 0 0,-1 1 0 0 0,1-1 0 0 0,-1 1 1 0 0,0-1-1 0 0,0 1 0 0 0,-1-1 1 0 0,1 0 54 0 0,-1 1 1 0 0,0-1 0 0 0,0 1 0 0 0,0-1 0 0 0,0 1 0 0 0,0 0-1 0 0,-4 0 1 0 0,-2 1 298 0 0,0 0 0 0 0,-16 4-1 0 0,19-4-213 0 0,-5 2-408 0 0,0 0 0 0 0,1 1 0 0 0,0 0 0 0 0,-1 1 0 0 0,1 0 1 0 0,1 0-1 0 0,-1 1 0 0 0,1 0 0 0 0,0 0 0 0 0,0 1 0 0 0,1 0 0 0 0,0 0 0 0 0,0 1 0 0 0,1 0 0 0 0,0 0 0 0 0,-9 15 1 0 0,-5 26 1032 0 0,20-47-1252 0 0,-1-1-1 0 0,1 1 1 0 0,-1-1-1 0 0,1 1 1 0 0,0 0 0 0 0,0-1-1 0 0,-1 1 1 0 0,1 0-1 0 0,0-1 1 0 0,0 1-1 0 0,1 0 1 0 0,-1-1-1 0 0,0 1 1 0 0,1 0 0 0 0,-1-1-1 0 0,1 1 1 0 0,-1-1-1 0 0,1 1 1 0 0,0 0-1 0 0,-1-1 1 0 0,1 0-1 0 0,0 1 1 0 0,0-1 0 0 0,0 0-1 0 0,0 1 1 0 0,0-1-1 0 0,1 0 1 0 0,-1 0-1 0 0,0 0 1 0 0,0 0 0 0 0,1 0-1 0 0,-1 0 1 0 0,1 0-1 0 0,-1 0 1 0 0,1-1-1 0 0,-1 1 1 0 0,1 0-1 0 0,-1-1 1 0 0,1 0 0 0 0,0 1-1 0 0,-1-1 1 0 0,1 0-1 0 0,0 0 1 0 0,-1 0-1 0 0,1 0 1 0 0,0 0-1 0 0,-1 0 1 0 0,1 0 0 0 0,0 0-1 0 0,-1-1 1 0 0,1 1-1 0 0,2-2 1 0 0,11-4 84 0 0,0 0 0 0 0,0-1 1 0 0,25-17-1 0 0,-5 0-5318 0 0,-23 16 1608 0 0,8-6-4699 0 0</inkml:trace>
+</inkml:ink>
+</file>
+
+<file path=ppt/ink/ink14.xml><?xml version="1.0" encoding="utf-8"?>
+<inkml:ink xmlns:inkml="http://www.w3.org/2003/InkML">
+  <inkml:definitions>
+    <inkml:context xml:id="ctx0">
+      <inkml:inkSource xml:id="inkSrc0">
+        <inkml:traceFormat>
+          <inkml:channel name="X" type="integer" min="-2.14748E9" max="2.14748E9" units="cm"/>
+          <inkml:channel name="Y" type="integer" min="-2.14748E9" max="2.14748E9" units="cm"/>
+          <inkml:channel name="F" type="integer" max="32767" units="dev"/>
+          <inkml:channel name="OA" type="integer" max="360" units="deg"/>
+          <inkml:channel name="OE" type="integer" max="90" units="deg"/>
+        </inkml:traceFormat>
+        <inkml:channelProperties>
+          <inkml:channelProperty channel="X" name="resolution" value="1000" units="1/cm"/>
+          <inkml:channelProperty channel="Y" name="resolution" value="1000" units="1/cm"/>
+          <inkml:channelProperty channel="F" name="resolution" value="0" units="1/dev"/>
+          <inkml:channelProperty channel="OA" name="resolution" value="1000" units="1/deg"/>
+          <inkml:channelProperty channel="OE" name="resolution" value="1000" units="1/deg"/>
+        </inkml:channelProperties>
+      </inkml:inkSource>
+      <inkml:timestamp xml:id="ts0" timeString="2021-03-29T19:02:15.106"/>
+    </inkml:context>
+    <inkml:brush xml:id="br0">
+      <inkml:brushProperty name="width" value="0.05" units="cm"/>
+      <inkml:brushProperty name="height" value="0.05" units="cm"/>
+      <inkml:brushProperty name="color" value="#E71224"/>
+    </inkml:brush>
+  </inkml:definitions>
+  <inkml:trace contextRef="#ctx0" brushRef="#br0">93 134 9672 0 0,'-1'2'748'0'0,"-3"6"171"0"0,0 1 1 0 0,1 0-1 0 0,0 0 1 0 0,0 0-1 0 0,-1 15 1 0 0,-1-1 1901 0 0,-40 195 4723 0 0,25-159-6424 0 0,19-46-708 0 0,2-13-60 0 0,1-7-227 0 0,18-108 198 0 0,-17 87-309 0 0,1 0 0 0 0,1 0 0 0 0,2 0 1 0 0,0 1-1 0 0,13-27 0 0 0,-16 43-18 0 0,3-5 80 0 0,1-1 0 0 0,1 1 0 0 0,0 0 0 0 0,12-15 0 0 0,-14 22 24 0 0,0 0 0 0 0,1 1 0 0 0,0-1 0 0 0,0 2 0 0 0,1-1 0 0 0,-1 1 0 0 0,2 0 0 0 0,-1 1 0 0 0,13-6 0 0 0,-17 9-55 0 0,0 1 0 0 0,0 1-1 0 0,0-1 1 0 0,0 1 0 0 0,0 0-1 0 0,0 0 1 0 0,0 0 0 0 0,9 0 0 0 0,-12 2-27 0 0,0-1 0 0 0,1 0 1 0 0,-1 1-1 0 0,0-1 1 0 0,1 1-1 0 0,-1-1 1 0 0,0 1-1 0 0,0 0 0 0 0,0 0 1 0 0,0 0-1 0 0,0 0 1 0 0,0 1-1 0 0,0-1 1 0 0,0 0-1 0 0,0 1 0 0 0,0 0 1 0 0,-1-1-1 0 0,1 1 1 0 0,-1 0-1 0 0,1 0 1 0 0,1 2-1 0 0,0 1 9 0 0,-1 0 1 0 0,1 0-1 0 0,-1 0 0 0 0,0 0 1 0 0,-1 0-1 0 0,1 0 0 0 0,-1 1 1 0 0,0-1-1 0 0,0 0 0 0 0,-1 1 0 0 0,1 10 1 0 0,-2-9-2 0 0,0 1-1 0 0,0-1 1 0 0,-1 0 0 0 0,0 1 0 0 0,0-1 0 0 0,-1 0-1 0 0,0 0 1 0 0,-4 8 0 0 0,-3 3 24 0 0,0 0 0 0 0,-20 24 0 0 0,25-36-56 0 0,0-1 0 0 0,0 1 0 0 0,-1-1 0 0 0,1 0 0 0 0,-1 0 0 0 0,0-1 0 0 0,0 0 0 0 0,-1 0 0 0 0,1 0 0 0 0,-12 3 0 0 0,16-6-247 0 0,-1 0 0 0 0,0-1-1 0 0,0 1 1 0 0,0-1 0 0 0,0 0 0 0 0,0 0-1 0 0,0 0 1 0 0,0 0 0 0 0,-4-1 0 0 0,-7-4-8355 0 0</inkml:trace>
+</inkml:ink>
+</file>
+
+<file path=ppt/ink/ink15.xml><?xml version="1.0" encoding="utf-8"?>
+<inkml:ink xmlns:inkml="http://www.w3.org/2003/InkML">
+  <inkml:definitions>
+    <inkml:context xml:id="ctx0">
+      <inkml:inkSource xml:id="inkSrc0">
+        <inkml:traceFormat>
+          <inkml:channel name="X" type="integer" min="-2.14748E9" max="2.14748E9" units="cm"/>
+          <inkml:channel name="Y" type="integer" min="-2.14748E9" max="2.14748E9" units="cm"/>
+          <inkml:channel name="F" type="integer" max="32767" units="dev"/>
+          <inkml:channel name="OA" type="integer" max="360" units="deg"/>
+          <inkml:channel name="OE" type="integer" max="90" units="deg"/>
+        </inkml:traceFormat>
+        <inkml:channelProperties>
+          <inkml:channelProperty channel="X" name="resolution" value="1000" units="1/cm"/>
+          <inkml:channelProperty channel="Y" name="resolution" value="1000" units="1/cm"/>
+          <inkml:channelProperty channel="F" name="resolution" value="0" units="1/dev"/>
+          <inkml:channelProperty channel="OA" name="resolution" value="1000" units="1/deg"/>
+          <inkml:channelProperty channel="OE" name="resolution" value="1000" units="1/deg"/>
+        </inkml:channelProperties>
+      </inkml:inkSource>
+      <inkml:timestamp xml:id="ts0" timeString="2021-03-29T19:02:15.443"/>
+    </inkml:context>
+    <inkml:brush xml:id="br0">
+      <inkml:brushProperty name="width" value="0.05" units="cm"/>
+      <inkml:brushProperty name="height" value="0.05" units="cm"/>
+      <inkml:brushProperty name="color" value="#E71224"/>
+    </inkml:brush>
+  </inkml:definitions>
+  <inkml:trace contextRef="#ctx0" brushRef="#br0">1 245 8288 0 0,'0'0'638'0'0,"18"4"2078"0"0,7-8 4066 0 0,-1-7-3548 0 0,22-19-1173 0 0,-37 23-1374 0 0,12-10 352 0 0,-1-1 0 0 0,33-38 0 0 0,-49 51-944 0 0,0-1 0 0 0,0 0 0 0 0,-1 0-1 0 0,0 0 1 0 0,0 0 0 0 0,0 0 0 0 0,-1-1-1 0 0,0 0 1 0 0,0 1 0 0 0,1-12 0 0 0,-2 17-86 0 0,-1 0 1 0 0,0 0 0 0 0,0 0-1 0 0,0 0 1 0 0,-1 0 0 0 0,1 0-1 0 0,0 0 1 0 0,0 0 0 0 0,0 0-1 0 0,-1 0 1 0 0,1 0 0 0 0,-1 0-1 0 0,1 0 1 0 0,-1 0 0 0 0,1 0-1 0 0,-1 0 1 0 0,1 1 0 0 0,-1-1-1 0 0,0 0 1 0 0,1 0 0 0 0,-1 1-1 0 0,0-1 1 0 0,0 0 0 0 0,1 1-1 0 0,-1-1 1 0 0,0 1 0 0 0,0-1-1 0 0,0 1 1 0 0,0-1 0 0 0,0 1-1 0 0,-1-1 1 0 0,-1 1 10 0 0,1 0-1 0 0,-1-1 1 0 0,1 1 0 0 0,0 0-1 0 0,-1 0 1 0 0,1 1 0 0 0,-1-1-1 0 0,1 0 1 0 0,0 1 0 0 0,-1 0-1 0 0,-3 1 1 0 0,-2 2 12 0 0,-1 1-1 0 0,1 0 1 0 0,0 0 0 0 0,0 1-1 0 0,1 0 1 0 0,0 0-1 0 0,0 1 1 0 0,0 0 0 0 0,1 0-1 0 0,0 0 1 0 0,0 1-1 0 0,-5 10 1 0 0,2-4 101 0 0,2 0 1 0 0,0 1-1 0 0,0 0 0 0 0,2 0 0 0 0,0 0 1 0 0,-5 25-1 0 0,9-33-81 0 0,0 1 0 0 0,0-1 0 0 0,1 1-1 0 0,0-1 1 0 0,0 1 0 0 0,1-1 0 0 0,0 1 0 0 0,2 7 0 0 0,-3-12-44 0 0,1 0 0 0 0,0 0 0 0 0,1 0 0 0 0,-1-1 0 0 0,0 1 0 0 0,1 0 0 0 0,-1-1 0 0 0,1 1 0 0 0,0-1 0 0 0,0 0 0 0 0,0 1 0 0 0,0-1 0 0 0,0 0 1 0 0,0 0-1 0 0,1 0 0 0 0,-1-1 0 0 0,1 1 0 0 0,-1-1 0 0 0,1 1 0 0 0,0-1 0 0 0,0 0 0 0 0,5 2 0 0 0,3-1-315 0 0,0 1-1 0 0,0-2 1 0 0,1 0-1 0 0,-1 0 1 0 0,1-1-1 0 0,-1 0 1 0 0,1-1-1 0 0,-1-1 1 0 0,1 0-1 0 0,-1 0 1 0 0,0-1-1 0 0,15-5 1 0 0,-9 0-908 0 0</inkml:trace>
+</inkml:ink>
+</file>
+
+<file path=ppt/ink/ink16.xml><?xml version="1.0" encoding="utf-8"?>
+<inkml:ink xmlns:inkml="http://www.w3.org/2003/InkML">
+  <inkml:definitions>
+    <inkml:context xml:id="ctx0">
+      <inkml:inkSource xml:id="inkSrc0">
+        <inkml:traceFormat>
+          <inkml:channel name="X" type="integer" min="-2.14748E9" max="2.14748E9" units="cm"/>
+          <inkml:channel name="Y" type="integer" min="-2.14748E9" max="2.14748E9" units="cm"/>
+          <inkml:channel name="F" type="integer" max="32767" units="dev"/>
+          <inkml:channel name="OA" type="integer" max="360" units="deg"/>
+          <inkml:channel name="OE" type="integer" max="90" units="deg"/>
+        </inkml:traceFormat>
+        <inkml:channelProperties>
+          <inkml:channelProperty channel="X" name="resolution" value="1000" units="1/cm"/>
+          <inkml:channelProperty channel="Y" name="resolution" value="1000" units="1/cm"/>
+          <inkml:channelProperty channel="F" name="resolution" value="0" units="1/dev"/>
+          <inkml:channelProperty channel="OA" name="resolution" value="1000" units="1/deg"/>
+          <inkml:channelProperty channel="OE" name="resolution" value="1000" units="1/deg"/>
+        </inkml:channelProperties>
+      </inkml:inkSource>
+      <inkml:timestamp xml:id="ts0" timeString="2021-03-29T19:02:20.348"/>
+    </inkml:context>
+    <inkml:brush xml:id="br0">
+      <inkml:brushProperty name="width" value="0.05" units="cm"/>
+      <inkml:brushProperty name="height" value="0.05" units="cm"/>
+      <inkml:brushProperty name="color" value="#E71224"/>
+    </inkml:brush>
+  </inkml:definitions>
+  <inkml:trace contextRef="#ctx0" brushRef="#br0">86 28 2304 0 0,'-1'1'167'0'0,"1"0"80"0"0,-1-1 1 0 0,1 1-1 0 0,-1 0 1 0 0,1-1 0 0 0,-1 1-1 0 0,0 0 1 0 0,1-1 0 0 0,-1 1-1 0 0,0-1 1 0 0,1 1-1 0 0,-1-1 1 0 0,0 1 0 0 0,1-1-1 0 0,-1 0 1 0 0,0 1-1 0 0,0-1 1 0 0,0 0 0 0 0,-1 1-1 0 0,-5 1 2571 0 0,5 0-2300 0 0,-1-1-1 0 0,0 0 1 0 0,0 0-1 0 0,0 0 1 0 0,0 0 0 0 0,-4 0-1 0 0,-9 3 1763 0 0,15-4-1151 0 0,-21 0 6538 0 0,26 3-6781 0 0,9 3-1097 0 0,45-1 1173 0 0,1-4 1 0 0,74-6-1 0 0,-73 4-701 0 0,19-3 15 0 0,186-20 452 0 0,-191 16-373 0 0,-1 4-1 0 0,108 8 1 0 0,-143 0-316 0 0,-30-2 18 0 0,0-1 0 0 0,0 1 0 0 0,1-2 0 0 0,-1 1 0 0 0,0-1-1 0 0,1-1 1 0 0,-1 0 0 0 0,0 0 0 0 0,15-4 0 0 0,-22 5 20 0 0,2-1-35 0 0,0-1-1 0 0,1 1 1 0 0,-1-1-1 0 0,0 0 1 0 0,0 0-1 0 0,0 0 0 0 0,4-4 1 0 0,5-3 1 0 0,-11 8-138 0 0,1 1-350 0 0,-1 0 92 0 0,0 0 0 0 0,0 0 0 0 0,0 0 0 0 0,0 1 0 0 0,1-1 0 0 0,-1 0 0 0 0,0 1 0 0 0,0-1 0 0 0,1 1-1 0 0,6 3-6519 0 0</inkml:trace>
+</inkml:ink>
+</file>
+
+<file path=ppt/ink/ink17.xml><?xml version="1.0" encoding="utf-8"?>
+<inkml:ink xmlns:inkml="http://www.w3.org/2003/InkML">
+  <inkml:definitions>
+    <inkml:context xml:id="ctx0">
+      <inkml:inkSource xml:id="inkSrc0">
+        <inkml:traceFormat>
+          <inkml:channel name="X" type="integer" min="-2.14748E9" max="2.14748E9" units="cm"/>
+          <inkml:channel name="Y" type="integer" min="-2.14748E9" max="2.14748E9" units="cm"/>
+          <inkml:channel name="F" type="integer" max="32767" units="dev"/>
+          <inkml:channel name="OA" type="integer" max="360" units="deg"/>
+          <inkml:channel name="OE" type="integer" max="90" units="deg"/>
+        </inkml:traceFormat>
+        <inkml:channelProperties>
+          <inkml:channelProperty channel="X" name="resolution" value="1000" units="1/cm"/>
+          <inkml:channelProperty channel="Y" name="resolution" value="1000" units="1/cm"/>
+          <inkml:channelProperty channel="F" name="resolution" value="0" units="1/dev"/>
+          <inkml:channelProperty channel="OA" name="resolution" value="1000" units="1/deg"/>
+          <inkml:channelProperty channel="OE" name="resolution" value="1000" units="1/deg"/>
+        </inkml:channelProperties>
+      </inkml:inkSource>
+      <inkml:timestamp xml:id="ts0" timeString="2021-03-29T19:02:54.648"/>
+    </inkml:context>
+    <inkml:brush xml:id="br0">
+      <inkml:brushProperty name="width" value="0.05" units="cm"/>
+      <inkml:brushProperty name="height" value="0.05" units="cm"/>
+      <inkml:brushProperty name="color" value="#E71224"/>
+    </inkml:brush>
+  </inkml:definitions>
+  <inkml:trace contextRef="#ctx0" brushRef="#br0">20 53 12440 0 0,'8'-17'1344'0'0,"0"1"878"0"0,-7 14-1441 0 0,0-1 1 0 0,0 1-1 0 0,0 0 1 0 0,1 0-1 0 0,-1 0 1 0 0,4-5 3953 0 0,-5 9-4162 0 0,-3 63 927 0 0,-16 87-1 0 0,6-59-1127 0 0,6-43-390 0 0,2 1-1 0 0,4 97 1 0 0,6-133-1411 0 0</inkml:trace>
+</inkml:ink>
+</file>
+
+<file path=ppt/ink/ink18.xml><?xml version="1.0" encoding="utf-8"?>
+<inkml:ink xmlns:inkml="http://www.w3.org/2003/InkML">
+  <inkml:definitions>
+    <inkml:context xml:id="ctx0">
+      <inkml:inkSource xml:id="inkSrc0">
+        <inkml:traceFormat>
+          <inkml:channel name="X" type="integer" min="-2.14748E9" max="2.14748E9" units="cm"/>
+          <inkml:channel name="Y" type="integer" min="-2.14748E9" max="2.14748E9" units="cm"/>
+          <inkml:channel name="F" type="integer" max="32767" units="dev"/>
+          <inkml:channel name="OA" type="integer" max="360" units="deg"/>
+          <inkml:channel name="OE" type="integer" max="90" units="deg"/>
+        </inkml:traceFormat>
+        <inkml:channelProperties>
+          <inkml:channelProperty channel="X" name="resolution" value="1000" units="1/cm"/>
+          <inkml:channelProperty channel="Y" name="resolution" value="1000" units="1/cm"/>
+          <inkml:channelProperty channel="F" name="resolution" value="0" units="1/dev"/>
+          <inkml:channelProperty channel="OA" name="resolution" value="1000" units="1/deg"/>
+          <inkml:channelProperty channel="OE" name="resolution" value="1000" units="1/deg"/>
+        </inkml:channelProperties>
+      </inkml:inkSource>
+      <inkml:timestamp xml:id="ts0" timeString="2021-03-29T19:02:55"/>
+    </inkml:context>
+    <inkml:brush xml:id="br0">
+      <inkml:brushProperty name="width" value="0.05" units="cm"/>
+      <inkml:brushProperty name="height" value="0.05" units="cm"/>
+      <inkml:brushProperty name="color" value="#E71224"/>
+    </inkml:brush>
+  </inkml:definitions>
+  <inkml:trace contextRef="#ctx0" brushRef="#br0">13 320 9216 0 0,'-1'0'91'0'0,"0"-1"0"0"0,0 1-1 0 0,1-1 1 0 0,-1 0 0 0 0,0 1 0 0 0,0-1 0 0 0,1 0 0 0 0,-1 0 0 0 0,1 0 0 0 0,-1 1 0 0 0,0-1 0 0 0,0-2 0 0 0,1 1 648 0 0,-1 1 1 0 0,1-1 0 0 0,-1 1 0 0 0,1-1 0 0 0,0 0 0 0 0,0 1 0 0 0,0-1-1 0 0,0 0 1 0 0,0 1 0 0 0,0-1 0 0 0,1-3 0 0 0,8-19 7176 0 0,-1 11-8445 0 0,48-80 3529 0 0,-32 49-2343 0 0,-15 25-418 0 0,16-23-1 0 0,-22 37-204 0 0,1 0-1 0 0,0 0 0 0 0,0 1 1 0 0,0 0-1 0 0,1-1 1 0 0,0 1-1 0 0,-1 1 0 0 0,1-1 1 0 0,6-2-1 0 0,-10 5-32 0 0,1 0 0 0 0,-1 0 0 0 0,1 1 0 0 0,-1-1 0 0 0,1 1 0 0 0,0-1 0 0 0,-1 1-1 0 0,1 0 1 0 0,-1-1 0 0 0,1 1 0 0 0,0 0 0 0 0,-1 0 0 0 0,1 0 0 0 0,-1 1 0 0 0,1-1 0 0 0,0 0 0 0 0,-1 0 0 0 0,1 1 0 0 0,2 0 0 0 0,-2 1-3 0 0,1-1 1 0 0,-1 1-1 0 0,0-1 1 0 0,0 1-1 0 0,0 0 1 0 0,0 0-1 0 0,0-1 1 0 0,0 2-1 0 0,0-1 1 0 0,2 4-1 0 0,0 1 22 0 0,0 0 0 0 0,0 1 0 0 0,0-1 1 0 0,-1 1-1 0 0,-1 0 0 0 0,3 12 0 0 0,-2-9 21 0 0,1 0 0 0 0,0 0 0 0 0,1 0 0 0 0,0 0 0 0 0,9 12 0 0 0,-1 1-475 0 0,-7-14-111 0 0,0-1 0 0 0,1 0 1 0 0,13 15-1 0 0,-6-10-1051 0 0</inkml:trace>
+</inkml:ink>
+</file>
+
+<file path=ppt/ink/ink19.xml><?xml version="1.0" encoding="utf-8"?>
+<inkml:ink xmlns:inkml="http://www.w3.org/2003/InkML">
+  <inkml:definitions>
+    <inkml:context xml:id="ctx0">
+      <inkml:inkSource xml:id="inkSrc0">
+        <inkml:traceFormat>
+          <inkml:channel name="X" type="integer" min="-2.14748E9" max="2.14748E9" units="cm"/>
+          <inkml:channel name="Y" type="integer" min="-2.14748E9" max="2.14748E9" units="cm"/>
+          <inkml:channel name="F" type="integer" max="32767" units="dev"/>
+          <inkml:channel name="OA" type="integer" max="360" units="deg"/>
+          <inkml:channel name="OE" type="integer" max="90" units="deg"/>
+        </inkml:traceFormat>
+        <inkml:channelProperties>
+          <inkml:channelProperty channel="X" name="resolution" value="1000" units="1/cm"/>
+          <inkml:channelProperty channel="Y" name="resolution" value="1000" units="1/cm"/>
+          <inkml:channelProperty channel="F" name="resolution" value="0" units="1/dev"/>
+          <inkml:channelProperty channel="OA" name="resolution" value="1000" units="1/deg"/>
+          <inkml:channelProperty channel="OE" name="resolution" value="1000" units="1/deg"/>
+        </inkml:channelProperties>
+      </inkml:inkSource>
+      <inkml:timestamp xml:id="ts0" timeString="2021-03-29T19:02:58.339"/>
+    </inkml:context>
+    <inkml:brush xml:id="br0">
+      <inkml:brushProperty name="width" value="0.05" units="cm"/>
+      <inkml:brushProperty name="height" value="0.05" units="cm"/>
+      <inkml:brushProperty name="color" value="#E71224"/>
+    </inkml:brush>
+  </inkml:definitions>
+  <inkml:trace contextRef="#ctx0" brushRef="#br0">134 55 8864 0 0,'0'0'406'0'0,"-12"-7"156"0"0,11 7-548 0 0,0-1 92 0 0,-1 1 0 0 0,1-1 0 0 0,0 1 0 0 0,0-1 1 0 0,-1 0-1 0 0,1 1 0 0 0,0-1 0 0 0,0 0 1 0 0,0 0-1 0 0,0 0 0 0 0,0 0 0 0 0,0 0 0 0 0,0 0 1 0 0,1 0-1 0 0,-2-1 0 0 0,2 1 482 0 0,-12-20 1701 0 0,11 20-2056 0 0,0 0-1 0 0,0 0 1 0 0,-1 0-1 0 0,1 0 1 0 0,0 0-1 0 0,0 0 1 0 0,0 1-1 0 0,-1-1 1 0 0,1 0-1 0 0,0 1 1 0 0,-1-1-1 0 0,1 1 1 0 0,-1-1-1 0 0,1 1 1 0 0,0 0-1 0 0,-1-1 1 0 0,1 1-1 0 0,-1 0 1 0 0,1 0-1 0 0,-1 0 1 0 0,1 0-1 0 0,-1 0 1 0 0,1 1-1 0 0,-1-1 1 0 0,1 0-1 0 0,0 1 1 0 0,-1-1-1 0 0,1 1 1 0 0,-1-1-1 0 0,1 1 1 0 0,0 0-1 0 0,0 0 1 0 0,-2 0-1 0 0,-7 5 1070 0 0,-4 3 1684 0 0,12-7-2625 0 0,1-1-1 0 0,-1 1 0 0 0,0-1 0 0 0,0 1 1 0 0,0-1-1 0 0,0 0 0 0 0,-4 2 1 0 0,20 7 349 0 0,12-5-411 0 0,1 0-1 0 0,-1-2 0 0 0,0-1 0 0 0,46-2 0 0 0,-49 0-148 0 0,36 3-1 0 0,-17-1-75 0 0,296 3 402 0 0,-316-3-421 0 0,1 0 0 0 0,37 9-1 0 0,-4-1 1 0 0,-39-7-55 0 0,-12-1 0 0 0,0-1 0 0 0,0 0 0 0 0,0-1 0 0 0,0 1 0 0 0,0-1 0 0 0,0 0 0 0 0,0 0 0 0 0,0 0 0 0 0,0-1 0 0 0,0 0 0 0 0,0 0 0 0 0,0 0 0 0 0,6-2 0 0 0,18-8 0 0 0,-25 10 0 0 0,0 0 0 0 0,0 0 0 0 0,0 0 0 0 0,0-1 0 0 0,-1 1 0 0 0,1-1 0 0 0,-1 0 0 0 0,1 0 0 0 0,3-3 0 0 0,-2 0 0 0 0,0 1 0 0 0,1-1 0 0 0,-1 0 0 0 0,1 1 0 0 0,0 0 0 0 0,1 1 0 0 0,7-4 0 0 0,-13 6-131 0 0,0 1 1 0 0,1-1-1 0 0,-1 1 0 0 0,0-1 0 0 0,0 1 1 0 0,1 0-1 0 0,-1-1 0 0 0,1 1 0 0 0,-1 0 1 0 0,0 0-1 0 0,1 0 0 0 0,-1 0 0 0 0,0 0 1 0 0,1 1-1 0 0,-1-1 0 0 0,0 0 0 0 0,1 1 1 0 0,-1-1-1 0 0,0 0 0 0 0,1 1 0 0 0,-1 0 1 0 0,0-1-1 0 0,0 1 0 0 0,0 0 0 0 0,0-1 1 0 0,1 2-1 0 0,1 0-377 0 0,-1 1 0 0 0,0-1 0 0 0,0 0 0 0 0,0 1 0 0 0,-1 0 0 0 0,1-1 0 0 0,-1 1 0 0 0,2 3 0 0 0,0 1-1590 0 0</inkml:trace>
+</inkml:ink>
+</file>
+
+<file path=ppt/ink/ink2.xml><?xml version="1.0" encoding="utf-8"?>
+<inkml:ink xmlns:inkml="http://www.w3.org/2003/InkML">
+  <inkml:definitions>
+    <inkml:context xml:id="ctx0">
+      <inkml:inkSource xml:id="inkSrc0">
+        <inkml:traceFormat>
+          <inkml:channel name="X" type="integer" min="-2.14748E9" max="2.14748E9" units="cm"/>
+          <inkml:channel name="Y" type="integer" min="-2.14748E9" max="2.14748E9" units="cm"/>
+          <inkml:channel name="F" type="integer" max="32767" units="dev"/>
+          <inkml:channel name="OA" type="integer" max="360" units="deg"/>
+          <inkml:channel name="OE" type="integer" max="90" units="deg"/>
+        </inkml:traceFormat>
+        <inkml:channelProperties>
+          <inkml:channelProperty channel="X" name="resolution" value="1000" units="1/cm"/>
+          <inkml:channelProperty channel="Y" name="resolution" value="1000" units="1/cm"/>
+          <inkml:channelProperty channel="F" name="resolution" value="0" units="1/dev"/>
+          <inkml:channelProperty channel="OA" name="resolution" value="1000" units="1/deg"/>
+          <inkml:channelProperty channel="OE" name="resolution" value="1000" units="1/deg"/>
+        </inkml:channelProperties>
+      </inkml:inkSource>
+      <inkml:timestamp xml:id="ts0" timeString="2021-03-29T19:01:58.527"/>
+    </inkml:context>
+    <inkml:brush xml:id="br0">
+      <inkml:brushProperty name="width" value="0.05" units="cm"/>
+      <inkml:brushProperty name="height" value="0.05" units="cm"/>
+      <inkml:brushProperty name="color" value="#E71224"/>
+    </inkml:brush>
+  </inkml:definitions>
+  <inkml:trace contextRef="#ctx0" brushRef="#br0">384 56 14712 0 0,'4'-15'1480'0'0,"-3"13"-1374"0"0,-1 1 0 0 0,0-1 1 0 0,1 0-1 0 0,-1 0 0 0 0,0 0 1 0 0,0 0-1 0 0,0 0 0 0 0,0 0 1 0 0,0 0-1 0 0,0 1 0 0 0,-1-1 1 0 0,1 0-1 0 0,-1 0 0 0 0,1 0 1 0 0,-1 0-1 0 0,-2-3 1450 0 0,3 5-1464 0 0,0-1 0 0 0,0 1 0 0 0,0 0 0 0 0,0 0 0 0 0,0-1-1 0 0,0 1 1 0 0,0 0 0 0 0,0 0 0 0 0,0-1 0 0 0,-1 1 0 0 0,1 0 0 0 0,0 0 0 0 0,0 0 0 0 0,0-1 0 0 0,0 1 0 0 0,-1 0 0 0 0,1 0 0 0 0,0 0 0 0 0,0 0 0 0 0,0 0 0 0 0,-1-1 0 0 0,1 1 0 0 0,0 0 0 0 0,0 0 0 0 0,-1 0 0 0 0,1 0 0 0 0,0 0-1 0 0,0 0 1 0 0,0 0 0 0 0,-1 0 0 0 0,1 0 0 0 0,0 0 0 0 0,-1 0 0 0 0,1 0 0 0 0,0 0 0 0 0,0 0 0 0 0,-1 0 0 0 0,1 0 0 0 0,0 0 0 0 0,0 0 0 0 0,0 0 0 0 0,-1 0 0 0 0,1 1 0 0 0,-12 3 718 0 0,4 5-680 0 0,1 0 0 0 0,0 0 0 0 0,0 0 1 0 0,1 1-1 0 0,0 0 0 0 0,-8 20 0 0 0,-4 4 285 0 0,-52 103 158 0 0,21-39-332 0 0,39-79-130 0 0,-1-1 0 0 0,0 0 1 0 0,-23 27-1 0 0,33-44-93 0 0,1-1-1 0 0,0 0 1 0 0,0 1 0 0 0,-1-1-1 0 0,1 0 1 0 0,0 0 0 0 0,-1 1 0 0 0,1-1-1 0 0,-1 0 1 0 0,1 0 0 0 0,0 0 0 0 0,-1 1-1 0 0,1-1 1 0 0,0 0 0 0 0,-1 0-1 0 0,1 0 1 0 0,-1 0 0 0 0,1 0 0 0 0,0 0-1 0 0,-1 0 1 0 0,1 0 0 0 0,-1 0 0 0 0,1 0-1 0 0,-1 0 1 0 0,1 0 0 0 0,0 0-1 0 0,-1 0 1 0 0,1 0 0 0 0,-1-1 0 0 0,-10-9 500 0 0,-5-18 78 0 0,7 7-468 0 0,2-2-1 0 0,0 1 1 0 0,2-1-1 0 0,-5-35 1 0 0,8 44-58 0 0,2 12-59 0 0,0 1-11 0 0,0 0 0 0 0,0 0 0 0 0,0 1 0 0 0,0-1 0 0 0,0 0 0 0 0,0 0 0 0 0,0 1 0 0 0,-1-1 0 0 0,1 0 0 0 0,0 0 0 0 0,0 1 0 0 0,-1-1 0 0 0,1 0 0 0 0,0 1 0 0 0,-1-1 0 0 0,1 1 0 0 0,-1-1 0 0 0,1 0 0 0 0,-1 1 0 0 0,0-1 0 0 0,1 1 0 0 0,0-1 0 0 0,0 1 0 0 0,0 0 0 0 0,0 0 0 0 0,0 0 0 0 0,-1 0 0 0 0,1 0 0 0 0,0-1 0 0 0,0 1 0 0 0,0 0 0 0 0,0 0 0 0 0,0 0 0 0 0,0 0 0 0 0,0 0 0 0 0,0 0 0 0 0,-1-1 0 0 0,1 1 0 0 0,0 0 0 0 0,0 0 0 0 0,0 0 0 0 0,0 0 0 0 0,0 0 0 0 0,-1 0 0 0 0,1 0 0 0 0,0 0 0 0 0,0 0 0 0 0,0 0 0 0 0,0 0 0 0 0,0 0 0 0 0,-1 0 0 0 0,1 0 0 0 0,0 0 0 0 0,0 0 0 0 0,0 0 0 0 0,0 0 0 0 0,-1 0 0 0 0,1 0 0 0 0,0 0 0 0 0,0 0 0 0 0,0 0 0 0 0,0 0 0 0 0,0 0 0 0 0,-1 0 0 0 0,1 0 0 0 0,0 0 0 0 0,0 1 0 0 0,0-1 0 0 0,0 0 0 0 0,0 0 0 0 0,-2 3 0 0 0,-1 3 0 0 0,1-1 0 0 0,0 1 0 0 0,1-1 0 0 0,-1 1 0 0 0,1 0 0 0 0,-1 11 0 0 0,3 39 0 0 0,-1-25 0 0 0,0-7 0 0 0,0-3 0 0 0,2 23 0 0 0,-2-38 0 0 0,1 0 0 0 0,0-1 0 0 0,1 1 0 0 0,-1 0 0 0 0,1-1 0 0 0,0 1 0 0 0,0-1 0 0 0,6 10 0 0 0,-7-14 16 0 0,0 0 0 0 0,1 1-1 0 0,-1-1 1 0 0,0 0 0 0 0,0 0 0 0 0,1 0-1 0 0,-1 0 1 0 0,1 0 0 0 0,-1 0 0 0 0,1-1-1 0 0,-1 1 1 0 0,1 0 0 0 0,-1-1-1 0 0,1 1 1 0 0,-1-1 0 0 0,1 1 0 0 0,0-1-1 0 0,-1 0 1 0 0,1 0 0 0 0,0 0 0 0 0,0 0-1 0 0,-1 0 1 0 0,1 0 0 0 0,0 0 0 0 0,-1-1-1 0 0,4 0 1 0 0,4-1 120 0 0,-1-1-1 0 0,1 0 1 0 0,13-7-1 0 0,-19 8-117 0 0,72-42 277 0 0,-29 15-251 0 0,71-40-2728 0 0,-104 60 964 0 0</inkml:trace>
+</inkml:ink>
+</file>
+
+<file path=ppt/ink/ink3.xml><?xml version="1.0" encoding="utf-8"?>
+<inkml:ink xmlns:inkml="http://www.w3.org/2003/InkML">
+  <inkml:definitions>
+    <inkml:context xml:id="ctx0">
+      <inkml:inkSource xml:id="inkSrc0">
+        <inkml:traceFormat>
+          <inkml:channel name="X" type="integer" min="-2.14748E9" max="2.14748E9" units="cm"/>
+          <inkml:channel name="Y" type="integer" min="-2.14748E9" max="2.14748E9" units="cm"/>
+          <inkml:channel name="F" type="integer" max="32767" units="dev"/>
+          <inkml:channel name="OA" type="integer" max="360" units="deg"/>
+          <inkml:channel name="OE" type="integer" max="90" units="deg"/>
+        </inkml:traceFormat>
+        <inkml:channelProperties>
+          <inkml:channelProperty channel="X" name="resolution" value="1000" units="1/cm"/>
+          <inkml:channelProperty channel="Y" name="resolution" value="1000" units="1/cm"/>
+          <inkml:channelProperty channel="F" name="resolution" value="0" units="1/dev"/>
+          <inkml:channelProperty channel="OA" name="resolution" value="1000" units="1/deg"/>
+          <inkml:channelProperty channel="OE" name="resolution" value="1000" units="1/deg"/>
+        </inkml:channelProperties>
+      </inkml:inkSource>
+      <inkml:timestamp xml:id="ts0" timeString="2021-03-29T19:02:04.799"/>
+    </inkml:context>
+    <inkml:brush xml:id="br0">
+      <inkml:brushProperty name="width" value="0.05" units="cm"/>
+      <inkml:brushProperty name="height" value="0.05" units="cm"/>
+      <inkml:brushProperty name="color" value="#E71224"/>
+    </inkml:brush>
+  </inkml:definitions>
+  <inkml:trace contextRef="#ctx0" brushRef="#br0">18 49 3224 0 0,'-13'-2'11955'0'0,"8"1"-11238"0"0,5 1-567 0 0,0-1 0 0 0,0 0 1 0 0,0 1-1 0 0,0-1 1 0 0,0 1-1 0 0,0-1 0 0 0,0 0 1 0 0,0 1-1 0 0,0-1 0 0 0,1 1 1 0 0,-1-1-1 0 0,0 1 1 0 0,0-1-1 0 0,0 0 0 0 0,1 1 1 0 0,-1-1-1 0 0,0 1 1 0 0,1-1-1 0 0,-1 1 0 0 0,0-1 1 0 0,1 1-1 0 0,-1 0 1 0 0,0-1-1 0 0,2 0 0 0 0,-2 0-105 0 0,1 0-1 0 0,0 0 0 0 0,0 1 0 0 0,0-1 1 0 0,0 0-1 0 0,0 0 0 0 0,0 1 1 0 0,0-1-1 0 0,0 0 0 0 0,0 1 0 0 0,0-1 1 0 0,0 1-1 0 0,0 0 0 0 0,2-1 0 0 0,29-3 832 0 0,-25 2-758 0 0,0 1 0 0 0,0 0-1 0 0,1 1 1 0 0,12 0-1 0 0,117 5 1225 0 0,-123-5-1164 0 0,109-3 911 0 0,-41 0-377 0 0,88 9-1 0 0,-40 1-470 0 0,2 1-60 0 0,231 5 1128 0 0,-137-6-752 0 0,-224-7-540 0 0,15 0 91 0 0,1 0 0 0 0,-1-1 0 0 0,1-1-1 0 0,-1 0 1 0 0,18-6 0 0 0,-30 7-48 0 0,0-1-18 0 0,0 1 0 0 0,0-1-1 0 0,-1 0 1 0 0,1 0 0 0 0,0 0 0 0 0,-1 0-1 0 0,1-1 1 0 0,-1 0 0 0 0,5-4-1 0 0,-9 7-38 0 0,1-1 0 0 0,0 1-1 0 0,-1 0 1 0 0,1-1 0 0 0,0 1 0 0 0,-1 0-1 0 0,1-1 1 0 0,0 1 0 0 0,-1 0-1 0 0,1 0 1 0 0,0 0 0 0 0,0 0-1 0 0,-1-1 1 0 0,1 1 0 0 0,0 0-1 0 0,0 0 1 0 0,-1 0 0 0 0,2 1-1 0 0,-1-1-1 0 0,0 0 1 0 0,-1 0-1 0 0,1 0 0 0 0,0 0 0 0 0,0 0 0 0 0,0 0 0 0 0,-1 0 0 0 0,1 0 1 0 0,0-1-1 0 0,0 1 0 0 0,0 0 0 0 0,-1 0 0 0 0,1-1 0 0 0,0 1 0 0 0,-1 0 0 0 0,1-1 1 0 0,0 1-1 0 0,0-1 0 0 0,-1 1 0 0 0,1-1 0 0 0,0 0-3 0 0,-1 1 1 0 0,0-1 0 0 0,0 1 0 0 0,0 0 0 0 0,0 0 0 0 0,0-1 0 0 0,0 1 1 0 0,1 0-1 0 0,-1 0 0 0 0,0 0 0 0 0,0-1 0 0 0,0 1 0 0 0,0 0 0 0 0,1 0 1 0 0,-1 0-1 0 0,0 0 0 0 0,0-1 0 0 0,1 1 0 0 0,-1 0 0 0 0,0 0 0 0 0,0 0 1 0 0,0 0-1 0 0,1 0 0 0 0,-1 0 0 0 0,0 0 0 0 0,0 0 0 0 0,1 0 0 0 0,-1 0 1 0 0,0 0-1 0 0,0 0 0 0 0,1 0 0 0 0,-1 0 0 0 0,0 0 0 0 0,0 0 0 0 0,1 0 1 0 0,-1 0-1 0 0,26 0-9143 0 0</inkml:trace>
+</inkml:ink>
+</file>
+
+<file path=ppt/ink/ink4.xml><?xml version="1.0" encoding="utf-8"?>
+<inkml:ink xmlns:inkml="http://www.w3.org/2003/InkML">
+  <inkml:definitions>
+    <inkml:context xml:id="ctx0">
+      <inkml:inkSource xml:id="inkSrc0">
+        <inkml:traceFormat>
+          <inkml:channel name="X" type="integer" min="-2.14748E9" max="2.14748E9" units="cm"/>
+          <inkml:channel name="Y" type="integer" min="-2.14748E9" max="2.14748E9" units="cm"/>
+          <inkml:channel name="F" type="integer" max="32767" units="dev"/>
+          <inkml:channel name="OA" type="integer" max="360" units="deg"/>
+          <inkml:channel name="OE" type="integer" max="90" units="deg"/>
+        </inkml:traceFormat>
+        <inkml:channelProperties>
+          <inkml:channelProperty channel="X" name="resolution" value="1000" units="1/cm"/>
+          <inkml:channelProperty channel="Y" name="resolution" value="1000" units="1/cm"/>
+          <inkml:channelProperty channel="F" name="resolution" value="0" units="1/dev"/>
+          <inkml:channelProperty channel="OA" name="resolution" value="1000" units="1/deg"/>
+          <inkml:channelProperty channel="OE" name="resolution" value="1000" units="1/deg"/>
+        </inkml:channelProperties>
+      </inkml:inkSource>
+      <inkml:timestamp xml:id="ts0" timeString="2021-03-29T19:02:07.616"/>
+    </inkml:context>
+    <inkml:brush xml:id="br0">
+      <inkml:brushProperty name="width" value="0.05" units="cm"/>
+      <inkml:brushProperty name="height" value="0.05" units="cm"/>
+      <inkml:brushProperty name="color" value="#E71224"/>
+    </inkml:brush>
+  </inkml:definitions>
+  <inkml:trace contextRef="#ctx0" brushRef="#br0">65 71 2304 0 0,'0'0'6260'0'0,"-18"-5"-2399"0"0,-24-20 2113 0 0,37 21-3457 0 0,9 4 929 0 0,6 3-3478 0 0,15 0 763 0 0,40 0-1 0 0,-53-3-633 0 0,103-2 670 0 0,-5 1-199 0 0,-59 1-328 0 0,20 4 96 0 0,-38-2-214 0 0,38-2-1 0 0,424-10 1283 0 0,-383 10-1012 0 0,-55 0-157 0 0,266-5-202 0 0,-249 8 88 0 0,-21-1-53 0 0,-36-1 49 0 0,-1 0 1 0 0,30 6-1 0 0,-34-8 75 0 0,-10 0-174 0 0,1 0 0 0 0,-1 0 0 0 0,1-1 0 0 0,-1 1 0 0 0,0-1 0 0 0,1 1 0 0 0,2-4 0 0 0,15-19-4526 0 0,-15 21 3127 0 0,2-2-10 0 0</inkml:trace>
+</inkml:ink>
+</file>
+
+<file path=ppt/ink/ink5.xml><?xml version="1.0" encoding="utf-8"?>
+<inkml:ink xmlns:inkml="http://www.w3.org/2003/InkML">
+  <inkml:definitions>
+    <inkml:context xml:id="ctx0">
+      <inkml:inkSource xml:id="inkSrc0">
+        <inkml:traceFormat>
+          <inkml:channel name="X" type="integer" min="-2.14748E9" max="2.14748E9" units="cm"/>
+          <inkml:channel name="Y" type="integer" min="-2.14748E9" max="2.14748E9" units="cm"/>
+          <inkml:channel name="F" type="integer" max="32767" units="dev"/>
+          <inkml:channel name="OA" type="integer" max="360" units="deg"/>
+          <inkml:channel name="OE" type="integer" max="90" units="deg"/>
+        </inkml:traceFormat>
+        <inkml:channelProperties>
+          <inkml:channelProperty channel="X" name="resolution" value="1000" units="1/cm"/>
+          <inkml:channelProperty channel="Y" name="resolution" value="1000" units="1/cm"/>
+          <inkml:channelProperty channel="F" name="resolution" value="0" units="1/dev"/>
+          <inkml:channelProperty channel="OA" name="resolution" value="1000" units="1/deg"/>
+          <inkml:channelProperty channel="OE" name="resolution" value="1000" units="1/deg"/>
+        </inkml:channelProperties>
+      </inkml:inkSource>
+      <inkml:timestamp xml:id="ts0" timeString="2021-03-29T19:02:11.356"/>
+    </inkml:context>
+    <inkml:brush xml:id="br0">
+      <inkml:brushProperty name="width" value="0.05" units="cm"/>
+      <inkml:brushProperty name="height" value="0.05" units="cm"/>
+      <inkml:brushProperty name="color" value="#E71224"/>
+    </inkml:brush>
+  </inkml:definitions>
+  <inkml:trace contextRef="#ctx0" brushRef="#br0">26 321 10592 0 0,'-9'-2'1104'0'0,"9"2"-969"0"0,-1 0 1 0 0,0 0-1 0 0,1 0 1 0 0,-1 0-1 0 0,0 0 1 0 0,1-1 0 0 0,-1 1-1 0 0,0 0 1 0 0,1 0-1 0 0,-1 0 1 0 0,0-1-1 0 0,1 1 1 0 0,-1 0-1 0 0,1-1 1 0 0,-1 1 0 0 0,1-1-1 0 0,-1 1 1 0 0,0 0-1 0 0,1-1 1 0 0,0 1-1 0 0,-1-1 1 0 0,1 1 0 0 0,-1-1-1 0 0,1 0 1 0 0,0 1-1 0 0,-1-1 1 0 0,1 1-1 0 0,0-1 1 0 0,-1 0-1 0 0,1 1 1 0 0,0-1 0 0 0,0 0-1 0 0,0 1 1 0 0,0-1-1 0 0,0 0 1 0 0,0 1-1 0 0,0-1 1 0 0,0 0-1 0 0,0 1 1 0 0,0-2 0 0 0,0 0 18 0 0,1 1 1 0 0,0 0-1 0 0,-1-1 1 0 0,1 1-1 0 0,0-1 1 0 0,0 1-1 0 0,0 0 1 0 0,0 0-1 0 0,0-1 1 0 0,0 1-1 0 0,0 0 1 0 0,0 0-1 0 0,2-1 1 0 0,5-3 63 0 0,0 0 1 0 0,1 0-1 0 0,0 1 0 0 0,-1 1 1 0 0,1-1-1 0 0,1 1 1 0 0,-1 1-1 0 0,0 0 1 0 0,1 0-1 0 0,-1 0 1 0 0,13 1-1 0 0,184-8 895 0 0,16-13-449 0 0,-175 13 43 0 0,70-23 1 0 0,-101 27-483 0 0,-12 4-195 0 0,10-3-7 0 0,0 0-1 0 0,0-1 1 0 0,19-11-1 0 0,-33 16-15 0 0,1 0-1 0 0,0-1 1 0 0,-1 1-1 0 0,1 0 1 0 0,-1-1-1 0 0,1 1 1 0 0,0 0 0 0 0,-1-1-1 0 0,1 1 1 0 0,-1-1-1 0 0,1 1 1 0 0,-1-1-1 0 0,1 1 1 0 0,-1-1-1 0 0,0 1 1 0 0,1-1-1 0 0,-1 0 1 0 0,0 1 0 0 0,1-1-1 0 0,-1 1 1 0 0,0-1-1 0 0,0 0 1 0 0,1 1-1 0 0,-1-1 1 0 0,0 0-1 0 0,0 1 1 0 0,0-1-1 0 0,0 0 1 0 0,0 0 0 0 0,0 1-1 0 0,0-1 1 0 0,0 0-1 0 0,0 1 1 0 0,0-1-1 0 0,-1 0 1 0 0,1 1-1 0 0,0-1 1 0 0,0 0-1 0 0,-1 1 1 0 0,1-1 0 0 0,0 1-1 0 0,-1-1 1 0 0,1 0-1 0 0,-1 0 1 0 0,-2-2-8 0 0,-1 0-1 0 0,1 0 1 0 0,0 0 0 0 0,-1 1 0 0 0,0-1 0 0 0,-5-1 0 0 0,-22-11 227 0 0,-1 1 0 0 0,-44-12 0 0 0,8 3-271 0 0,63 22 43 0 0,-11-6-76 0 0,19 5 34 0 0,9 2 24 0 0,5 0 19 0 0,-1 0 0 0 0,1 1-1 0 0,-1 1 1 0 0,1 1 0 0 0,-1 0-1 0 0,0 1 1 0 0,27 11 0 0 0,-40-14 39 0 0,1 1 0 0 0,-1 0 1 0 0,0 0-1 0 0,0 0 1 0 0,0 0-1 0 0,0 0 0 0 0,0 1 1 0 0,0-1-1 0 0,0 1 1 0 0,-1 0-1 0 0,0 0 1 0 0,1 0-1 0 0,-1 0 0 0 0,0 0 1 0 0,-1 1-1 0 0,1-1 1 0 0,2 6-1 0 0,-3-4 27 0 0,0-1-1 0 0,0 1 1 0 0,0-1-1 0 0,-1 1 0 0 0,0 0 1 0 0,0-1-1 0 0,0 1 1 0 0,0 0-1 0 0,-1-1 1 0 0,0 1-1 0 0,0-1 1 0 0,0 1-1 0 0,0-1 1 0 0,-3 5-1 0 0,-31 71 536 0 0,29-68-591 0 0,-1 1 0 0 0,-1-1 0 0 0,0-1 0 0 0,-11 13 0 0 0,-10 13-3014 0 0,18-28 1357 0 0</inkml:trace>
+</inkml:ink>
+</file>
+
+<file path=ppt/ink/ink6.xml><?xml version="1.0" encoding="utf-8"?>
+<inkml:ink xmlns:inkml="http://www.w3.org/2003/InkML">
+  <inkml:definitions>
+    <inkml:context xml:id="ctx0">
+      <inkml:inkSource xml:id="inkSrc0">
+        <inkml:traceFormat>
+          <inkml:channel name="X" type="integer" min="-2.14748E9" max="2.14748E9" units="cm"/>
+          <inkml:channel name="Y" type="integer" min="-2.14748E9" max="2.14748E9" units="cm"/>
+          <inkml:channel name="F" type="integer" max="32767" units="dev"/>
+          <inkml:channel name="OA" type="integer" max="360" units="deg"/>
+          <inkml:channel name="OE" type="integer" max="90" units="deg"/>
+        </inkml:traceFormat>
+        <inkml:channelProperties>
+          <inkml:channelProperty channel="X" name="resolution" value="1000" units="1/cm"/>
+          <inkml:channelProperty channel="Y" name="resolution" value="1000" units="1/cm"/>
+          <inkml:channelProperty channel="F" name="resolution" value="0" units="1/dev"/>
+          <inkml:channelProperty channel="OA" name="resolution" value="1000" units="1/deg"/>
+          <inkml:channelProperty channel="OE" name="resolution" value="1000" units="1/deg"/>
+        </inkml:channelProperties>
+      </inkml:inkSource>
+      <inkml:timestamp xml:id="ts0" timeString="2021-03-29T19:02:12.254"/>
+    </inkml:context>
+    <inkml:brush xml:id="br0">
+      <inkml:brushProperty name="width" value="0.05" units="cm"/>
+      <inkml:brushProperty name="height" value="0.05" units="cm"/>
+      <inkml:brushProperty name="color" value="#E71224"/>
+    </inkml:brush>
+  </inkml:definitions>
+  <inkml:trace contextRef="#ctx0" brushRef="#br0">330 68 9504 0 0,'0'0'858'0'0,"3"-10"2157"0"0,-2 8-2805 0 0,-1 0-1 0 0,1 1 1 0 0,-1-1 0 0 0,0 0 0 0 0,1 0-1 0 0,-1 0 1 0 0,0 0 0 0 0,0 1 0 0 0,0-1-1 0 0,-1 0 1 0 0,1 0 0 0 0,0 0 0 0 0,-1 0-1 0 0,1 1 1 0 0,-1-1 0 0 0,0 0 0 0 0,1 0-1 0 0,-1 1 1 0 0,0-1 0 0 0,0 1 0 0 0,0-1-1 0 0,0 1 1 0 0,-1-1 0 0 0,1 1 0 0 0,0-1-1 0 0,0 1 1 0 0,-1 0 0 0 0,1 0-1 0 0,-1 0 1 0 0,1 0 0 0 0,-4-2 0 0 0,-3 1-87 0 0,0 1 1 0 0,0 0 0 0 0,0 1 0 0 0,0 0-1 0 0,0 0 1 0 0,0 0 0 0 0,0 1 0 0 0,0 0-1 0 0,0 1 1 0 0,0 0 0 0 0,0 0 0 0 0,0 0 0 0 0,1 1-1 0 0,-11 6 1 0 0,4-2 102 0 0,1 0 0 0 0,0 1 0 0 0,0 1 0 0 0,1 0 0 0 0,0 1 0 0 0,-19 20 0 0 0,21-19-166 0 0,2 0-1 0 0,-1 1 1 0 0,2 0-1 0 0,0 0 0 0 0,0 0 1 0 0,-7 20-1 0 0,11-26-38 0 0,2-1 0 0 0,-1 0 0 0 0,0 1-1 0 0,1-1 1 0 0,0 1 0 0 0,1-1 0 0 0,-1 1 0 0 0,1-1-1 0 0,0 1 1 0 0,0-1 0 0 0,1 1 0 0 0,-1 0 0 0 0,1-1-1 0 0,1 0 1 0 0,-1 1 0 0 0,1-1 0 0 0,0 0 0 0 0,0 1-1 0 0,4 6 1 0 0,-5-11-20 0 0,0 0 0 0 0,0 0 0 0 0,0 0-1 0 0,-1 1 1 0 0,2-1 0 0 0,-1 0 0 0 0,0 0 0 0 0,0 0-1 0 0,0-1 1 0 0,0 1 0 0 0,1 0 0 0 0,-1 0-1 0 0,0-1 1 0 0,1 1 0 0 0,-1-1 0 0 0,1 1 0 0 0,-1-1-1 0 0,0 1 1 0 0,1-1 0 0 0,2 0 0 0 0,-1 0 19 0 0,1 0-1 0 0,-1 0 1 0 0,0-1 0 0 0,0 0 0 0 0,0 1 0 0 0,1-1 0 0 0,-1 0 0 0 0,0-1 0 0 0,3-1-1 0 0,4-2 58 0 0,-1-1 0 0 0,0 0 0 0 0,0-1 0 0 0,14-13 0 0 0,-12 7 213 0 0,-1 1 0 0 0,-1-1-1 0 0,0-1 1 0 0,-1 1 0 0 0,0-1 0 0 0,-1-1-1 0 0,7-20 1 0 0,-13 33-117 0 0,-1 1-150 0 0,1-1 0 0 0,0 1 1 0 0,0 0-1 0 0,0 0 0 0 0,0 0 1 0 0,0 0-1 0 0,0 0 0 0 0,1 0 1 0 0,-1 1-1 0 0,0-1 0 0 0,0 0 1 0 0,1 1-1 0 0,-1-1 0 0 0,0 0 1 0 0,3 0-1 0 0,-1 2-8 0 0,0-1-1 0 0,0 0 1 0 0,1 1-1 0 0,-1 0 1 0 0,0 0 0 0 0,0 0-1 0 0,0 0 1 0 0,0 0-1 0 0,0 1 1 0 0,0-1-1 0 0,0 1 1 0 0,0 0 0 0 0,-1 0-1 0 0,1 0 1 0 0,0 0-1 0 0,-1 0 1 0 0,0 1-1 0 0,0-1 1 0 0,1 1 0 0 0,-2-1-1 0 0,1 1 1 0 0,0 0-1 0 0,2 3 1 0 0,0 3-6 0 0,0-1 0 0 0,-1 1 1 0 0,0 0-1 0 0,0 0 0 0 0,-1 0 1 0 0,0 0-1 0 0,0 11 0 0 0,0-4 39 0 0,-2 1-1 0 0,0 0 1 0 0,-1 0-1 0 0,-1-1 1 0 0,-1 1-1 0 0,0-1 1 0 0,-9 28 0 0 0,4-22 38 0 0,-1-1 0 0 0,-1 0 0 0 0,-1 0 0 0 0,0-1 0 0 0,-16 19 0 0 0,18-27-163 0 0,2 0 166 0 0,-2-1 0 0 0,1-1 0 0 0,-2 1 0 0 0,-10 9 0 0 0,17-18-170 0 0,1 0 0 0 0,-1 0-1 0 0,0 0 1 0 0,0 0 0 0 0,0-1-1 0 0,0 1 1 0 0,0-1-1 0 0,0 0 1 0 0,0 0 0 0 0,0 0-1 0 0,-1 0 1 0 0,1 0-1 0 0,0-1 1 0 0,-1 1 0 0 0,1-1-1 0 0,0 0 1 0 0,-1 0-1 0 0,1 0 1 0 0,0-1 0 0 0,-1 1-1 0 0,-6-3 1 0 0,9 3-81 0 0,0-1 1 0 0,-1 1-1 0 0,1-1 1 0 0,-1 0-1 0 0,1 0 1 0 0,0 1-1 0 0,-1-1 1 0 0,1 0-1 0 0,0 0 1 0 0,0-1-1 0 0,0 1 1 0 0,0 0-1 0 0,0 0 1 0 0,0 0-1 0 0,0-1 1 0 0,0 1-1 0 0,0 0 1 0 0,1-1-1 0 0,-1 1 1 0 0,1-1-1 0 0,-1 1 1 0 0,1-1-1 0 0,-1 1 1 0 0,1-1-1 0 0,0 1 0 0 0,0-1 1 0 0,-1 1-1 0 0,2-4 1 0 0,-1-9-1286 0 0</inkml:trace>
+</inkml:ink>
+</file>
+
+<file path=ppt/ink/ink7.xml><?xml version="1.0" encoding="utf-8"?>
+<inkml:ink xmlns:inkml="http://www.w3.org/2003/InkML">
+  <inkml:definitions>
+    <inkml:context xml:id="ctx0">
+      <inkml:inkSource xml:id="inkSrc0">
+        <inkml:traceFormat>
+          <inkml:channel name="X" type="integer" min="-2.14748E9" max="2.14748E9" units="cm"/>
+          <inkml:channel name="Y" type="integer" min="-2.14748E9" max="2.14748E9" units="cm"/>
+          <inkml:channel name="F" type="integer" max="32767" units="dev"/>
+          <inkml:channel name="OA" type="integer" max="360" units="deg"/>
+          <inkml:channel name="OE" type="integer" max="90" units="deg"/>
+        </inkml:traceFormat>
+        <inkml:channelProperties>
+          <inkml:channelProperty channel="X" name="resolution" value="1000" units="1/cm"/>
+          <inkml:channelProperty channel="Y" name="resolution" value="1000" units="1/cm"/>
+          <inkml:channelProperty channel="F" name="resolution" value="0" units="1/dev"/>
+          <inkml:channelProperty channel="OA" name="resolution" value="1000" units="1/deg"/>
+          <inkml:channelProperty channel="OE" name="resolution" value="1000" units="1/deg"/>
+        </inkml:channelProperties>
+      </inkml:inkSource>
+      <inkml:timestamp xml:id="ts0" timeString="2021-03-29T19:02:12.622"/>
+    </inkml:context>
+    <inkml:brush xml:id="br0">
+      <inkml:brushProperty name="width" value="0.05" units="cm"/>
+      <inkml:brushProperty name="height" value="0.05" units="cm"/>
+      <inkml:brushProperty name="color" value="#E71224"/>
+    </inkml:brush>
+  </inkml:definitions>
+  <inkml:trace contextRef="#ctx0" brushRef="#br0">1 37 13824 0 0,'1'-2'190'0'0,"-1"0"0"0"0,1-1 0 0 0,0 1 0 0 0,0 0 0 0 0,1 0 0 0 0,-1 0 1 0 0,0 0-1 0 0,1 0 0 0 0,-1 1 0 0 0,1-1 0 0 0,-1 0 0 0 0,1 0 0 0 0,0 1 1 0 0,0-1-1 0 0,0 1 0 0 0,2-1 0 0 0,-3 1-10 0 0,0 0-1 0 0,0 1 1 0 0,0-1 0 0 0,0 1-1 0 0,0 0 1 0 0,1-1 0 0 0,-1 1-1 0 0,0 0 1 0 0,0 0 0 0 0,0 0 0 0 0,1-1-1 0 0,-1 1 1 0 0,0 1 0 0 0,0-1-1 0 0,1 0 1 0 0,-1 0 0 0 0,0 0-1 0 0,0 1 1 0 0,0-1 0 0 0,0 0 0 0 0,1 1-1 0 0,-1-1 1 0 0,0 1 0 0 0,0 0-1 0 0,0-1 1 0 0,0 1 0 0 0,0 0-1 0 0,0-1 1 0 0,0 1 0 0 0,0 0 0 0 0,-1 0-1 0 0,3 2 1 0 0,0 2-126 0 0,0 0 1 0 0,0 0-1 0 0,0 1 0 0 0,0-1 1 0 0,-1 1-1 0 0,0 0 0 0 0,0-1 1 0 0,0 1-1 0 0,-1 0 0 0 0,0 0 0 0 0,0 9 1 0 0,0 7-99 0 0,-4 40 0 0 0,2-45 85 0 0,-11 60 817 0 0,11-70-611 0 0,0 1 1 0 0,-1 0 0 0 0,0 0-1 0 0,-5 11 961 0 0,7-25-1052 0 0,0 0-1 0 0,0 1 0 0 0,0-1 1 0 0,1 0-1 0 0,0 0 0 0 0,0 1 0 0 0,0-1 1 0 0,1 0-1 0 0,0 1 0 0 0,2-6 1 0 0,5-7 142 0 0,16-26 1 0 0,-18 32-157 0 0,-1 4-101 0 0,0 0-1 0 0,1 0 1 0 0,0 0 0 0 0,0 1-1 0 0,0 0 1 0 0,1 1-1 0 0,0-1 1 0 0,0 2 0 0 0,1-1-1 0 0,-1 1 1 0 0,1 0-1 0 0,17-6 1 0 0,-21 10-277 0 0,0-1 0 0 0,0 1 0 0 0,1 0-1 0 0,-1 0 1 0 0,0 0 0 0 0,1 1 0 0 0,-1 0 0 0 0,0 0 0 0 0,1 0 0 0 0,-1 1-1 0 0,7 1 1 0 0,3 2-1779 0 0,-1 0 0 0 0,23 11 0 0 0,-2-1-1334 0 0,-23-10-4158 0 0</inkml:trace>
+</inkml:ink>
+</file>
+
+<file path=ppt/ink/ink8.xml><?xml version="1.0" encoding="utf-8"?>
+<inkml:ink xmlns:inkml="http://www.w3.org/2003/InkML">
+  <inkml:definitions>
+    <inkml:context xml:id="ctx0">
+      <inkml:inkSource xml:id="inkSrc0">
+        <inkml:traceFormat>
+          <inkml:channel name="X" type="integer" min="-2.14748E9" max="2.14748E9" units="cm"/>
+          <inkml:channel name="Y" type="integer" min="-2.14748E9" max="2.14748E9" units="cm"/>
+          <inkml:channel name="F" type="integer" max="32767" units="dev"/>
+          <inkml:channel name="OA" type="integer" max="360" units="deg"/>
+          <inkml:channel name="OE" type="integer" max="90" units="deg"/>
+        </inkml:traceFormat>
+        <inkml:channelProperties>
+          <inkml:channelProperty channel="X" name="resolution" value="1000" units="1/cm"/>
+          <inkml:channelProperty channel="Y" name="resolution" value="1000" units="1/cm"/>
+          <inkml:channelProperty channel="F" name="resolution" value="0" units="1/dev"/>
+          <inkml:channelProperty channel="OA" name="resolution" value="1000" units="1/deg"/>
+          <inkml:channelProperty channel="OE" name="resolution" value="1000" units="1/deg"/>
+        </inkml:channelProperties>
+      </inkml:inkSource>
+      <inkml:timestamp xml:id="ts0" timeString="2021-03-29T19:02:12.970"/>
+    </inkml:context>
+    <inkml:brush xml:id="br0">
+      <inkml:brushProperty name="width" value="0.05" units="cm"/>
+      <inkml:brushProperty name="height" value="0.05" units="cm"/>
+      <inkml:brushProperty name="color" value="#E71224"/>
+    </inkml:brush>
+  </inkml:definitions>
+  <inkml:trace contextRef="#ctx0" brushRef="#br0">201 4 15664 0 0,'-3'-1'183'0'0,"-1"0"0"0"0,1 0 0 0 0,-1 1 0 0 0,1 0 0 0 0,-1-1 1 0 0,1 1-1 0 0,-1 0 0 0 0,1 1 0 0 0,0-1 0 0 0,-1 1 1 0 0,1 0-1 0 0,-1-1 0 0 0,1 1 0 0 0,0 1 0 0 0,0-1 1 0 0,-1 0-1 0 0,1 1 0 0 0,0 0 0 0 0,0 0 0 0 0,1 0 1 0 0,-5 3-1 0 0,-6 6 698 0 0,0 0 0 0 0,1 1 0 0 0,-11 13 1 0 0,22-23-831 0 0,-6 7 27 0 0,0 1 1 0 0,0 0-1 0 0,1 0 0 0 0,0 0 0 0 0,1 1 1 0 0,-6 16-1 0 0,8-18-29 0 0,0 0 1 0 0,1 0-1 0 0,0 0 1 0 0,0 1-1 0 0,1-1 1 0 0,1 0-1 0 0,-1 1 1 0 0,3 16-1 0 0,-2-25-35 0 0,0 0-1 0 0,0 0 0 0 0,0 0 0 0 0,0 0 1 0 0,0-1-1 0 0,0 1 0 0 0,0 0 1 0 0,1 0-1 0 0,-1 0 0 0 0,0 0 0 0 0,1 0 1 0 0,-1 0-1 0 0,1-1 0 0 0,-1 1 1 0 0,1 0-1 0 0,-1 0 0 0 0,1-1 1 0 0,-1 1-1 0 0,1 0 0 0 0,0-1 0 0 0,-1 1 1 0 0,1-1-1 0 0,0 1 0 0 0,0-1 1 0 0,-1 1-1 0 0,1-1 0 0 0,0 1 1 0 0,0-1-1 0 0,0 0 0 0 0,0 1 0 0 0,0-1 1 0 0,-1 0-1 0 0,1 0 0 0 0,0 0 1 0 0,0 1-1 0 0,0-1 0 0 0,0 0 0 0 0,0 0 1 0 0,0-1-1 0 0,0 1 0 0 0,0 0 1 0 0,0 0-1 0 0,-1 0 0 0 0,1 0 1 0 0,0-1-1 0 0,0 1 0 0 0,0-1 0 0 0,0 1 1 0 0,0 0-1 0 0,0-2 0 0 0,6-1 111 0 0,-1-1-1 0 0,1 0 1 0 0,-1 0 0 0 0,10-10-1 0 0,-2 0 550 0 0,22-29 0 0 0,-26 30-158 0 0,0 1 0 0 0,1 0 1 0 0,24-20-1 0 0,-35 31-504 0 0,1 0 1 0 0,0 1 0 0 0,0-1-1 0 0,0 0 1 0 0,0 1 0 0 0,0-1-1 0 0,0 1 1 0 0,1-1 0 0 0,-1 1-1 0 0,0-1 1 0 0,0 1 0 0 0,0 0-1 0 0,0 0 1 0 0,0-1 0 0 0,1 1-1 0 0,-1 0 1 0 0,0 0 0 0 0,0 0-1 0 0,0 0 1 0 0,1 1-1 0 0,-1-1 1 0 0,0 0 0 0 0,0 0-1 0 0,0 1 1 0 0,0-1 0 0 0,0 0-1 0 0,1 1 1 0 0,-1 0 0 0 0,0-1-1 0 0,0 1 1 0 0,0-1 0 0 0,0 1-1 0 0,0 0 1 0 0,-1 0 0 0 0,1 0-1 0 0,0-1 1 0 0,0 1 0 0 0,1 2-1 0 0,2 4 83 0 0,1 0 0 0 0,-2 0 0 0 0,1 0 0 0 0,4 14 0 0 0,-1-6-41 0 0,-2-1-271 0 0,-3-9-171 0 0,1 0-1 0 0,-1 1 0 0 0,1-1 1 0 0,0 0-1 0 0,0 0 1 0 0,5 6-1 0 0,-7-10 291 0 0,0 0-1 0 0,0 0 0 0 0,1 0 0 0 0,-1 0 0 0 0,0 0 1 0 0,1-1-1 0 0,-1 1 0 0 0,1 0 0 0 0,-1-1 1 0 0,1 1-1 0 0,-1-1 0 0 0,1 1 0 0 0,-1-1 0 0 0,1 0 1 0 0,0 1-1 0 0,-1-1 0 0 0,1 0 0 0 0,0 0 0 0 0,-1 0 1 0 0,1 0-1 0 0,-1-1 0 0 0,1 1 0 0 0,0 0 0 0 0,-1-1 1 0 0,1 1-1 0 0,-1-1 0 0 0,1 1 0 0 0,1-2 1 0 0,10-5-1887 0 0</inkml:trace>
+</inkml:ink>
+</file>
+
+<file path=ppt/ink/ink9.xml><?xml version="1.0" encoding="utf-8"?>
+<inkml:ink xmlns:inkml="http://www.w3.org/2003/InkML">
+  <inkml:definitions>
+    <inkml:context xml:id="ctx0">
+      <inkml:inkSource xml:id="inkSrc0">
+        <inkml:traceFormat>
+          <inkml:channel name="X" type="integer" min="-2.14748E9" max="2.14748E9" units="cm"/>
+          <inkml:channel name="Y" type="integer" min="-2.14748E9" max="2.14748E9" units="cm"/>
+          <inkml:channel name="F" type="integer" max="32767" units="dev"/>
+          <inkml:channel name="OA" type="integer" max="360" units="deg"/>
+          <inkml:channel name="OE" type="integer" max="90" units="deg"/>
+        </inkml:traceFormat>
+        <inkml:channelProperties>
+          <inkml:channelProperty channel="X" name="resolution" value="1000" units="1/cm"/>
+          <inkml:channelProperty channel="Y" name="resolution" value="1000" units="1/cm"/>
+          <inkml:channelProperty channel="F" name="resolution" value="0" units="1/dev"/>
+          <inkml:channelProperty channel="OA" name="resolution" value="1000" units="1/deg"/>
+          <inkml:channelProperty channel="OE" name="resolution" value="1000" units="1/deg"/>
+        </inkml:channelProperties>
+      </inkml:inkSource>
+      <inkml:timestamp xml:id="ts0" timeString="2021-03-29T19:02:13.387"/>
+    </inkml:context>
+    <inkml:brush xml:id="br0">
+      <inkml:brushProperty name="width" value="0.05" units="cm"/>
+      <inkml:brushProperty name="height" value="0.05" units="cm"/>
+      <inkml:brushProperty name="color" value="#E71224"/>
+    </inkml:brush>
+  </inkml:definitions>
+  <inkml:trace contextRef="#ctx0" brushRef="#br0">156 353 4608 0 0,'-8'3'407'0'0,"0"0"5"0"0,1 1 1 0 0,0 0-1 0 0,-10 8 1 0 0,8-5 1350 0 0,1 0 1 0 0,0 1 0 0 0,1 0-1 0 0,-10 12 1 0 0,9-8 166 0 0,1 0 0 0 0,0 0 0 0 0,-6 14 0 0 0,-2 17-2231 0 0,12-32 541 0 0,1 0 0 0 0,0 0 1 0 0,1 1-1 0 0,0-1 0 0 0,0 14 0 0 0,1-21-192 0 0,1-1-1 0 0,-1 1 0 0 0,0 0 0 0 0,1 0 0 0 0,0-1 0 0 0,0 1 1 0 0,0-1-1 0 0,0 1 0 0 0,1-1 0 0 0,-1 1 0 0 0,1-1 0 0 0,0 0 1 0 0,0 0-1 0 0,0 0 0 0 0,0 0 0 0 0,1 0 0 0 0,-1 0 0 0 0,1-1 1 0 0,0 1-1 0 0,3 2 0 0 0,-4-4-28 0 0,1 0 0 0 0,0 0-1 0 0,0 0 1 0 0,-1 0 0 0 0,1 0 0 0 0,0-1 0 0 0,0 1 0 0 0,0-1-1 0 0,0 0 1 0 0,0 0 0 0 0,0 0 0 0 0,0 0 0 0 0,0 0 0 0 0,0-1-1 0 0,-1 1 1 0 0,1-1 0 0 0,0 0 0 0 0,0 0 0 0 0,0 0 0 0 0,3-2-1 0 0,4-2 25 0 0,1-1-1 0 0,-1 0 1 0 0,16-12-1 0 0,-16 10-72 0 0,-1-1-1 0 0,0 1 1 0 0,-1-2 0 0 0,12-15-1 0 0,25-46 816 0 0,-42 67-708 0 0,8-16 252 0 0,0-2 1 0 0,14-40-1 0 0,7-49 279 0 0,-9 29-233 0 0,33-118 1355 0 0,-49 183-1612 0 0,-7 17-113 0 0,1 0 1 0 0,-1 0 0 0 0,0 1 0 0 0,0-1 0 0 0,0 0 0 0 0,1 0-1 0 0,-1 1 1 0 0,0-1 0 0 0,0 0 0 0 0,0 1 0 0 0,0-1 0 0 0,0 0 0 0 0,0 1-1 0 0,1-1 1 0 0,-1 0 0 0 0,0 0 0 0 0,0 1 0 0 0,0-1 0 0 0,0 0-1 0 0,0 1 1 0 0,0-1 0 0 0,0 0 0 0 0,-1 1 0 0 0,1-1 0 0 0,0 0 0 0 0,0 1-1 0 0,-3 38 193 0 0,-20 180-166 0 0,21 0 0 0 0,3-200-11 0 0,1-1 1 0 0,6 25-1 0 0,-7-37-180 0 0,1 0-1 0 0,0 1 1 0 0,1-1 0 0 0,-1 0 0 0 0,1 0-1 0 0,0-1 1 0 0,1 1 0 0 0,-1-1 0 0 0,1 1-1 0 0,6 5 1 0 0,-6-8-341 0 0,-1 0 0 0 0,1 0 0 0 0,0 0 0 0 0,0 0-1 0 0,9 3 1 0 0,10 2-8348 0 0,-14-7 1362 0 0</inkml:trace>
+</inkml:ink>
 </file>
 
 <file path=ppt/notesMasters/notesMaster1.xml><?xml version="1.0" encoding="utf-8"?>
@@ -4551,6 +5159,996 @@
           </a:p>
         </p:txBody>
       </p:sp>
+      <mc:AlternateContent xmlns:mc="http://schemas.openxmlformats.org/markup-compatibility/2006">
+        <mc:Choice xmlns:p14="http://schemas.microsoft.com/office/powerpoint/2010/main" Requires="p14">
+          <p:contentPart p14:bwMode="auto" r:id="rId2">
+            <p14:nvContentPartPr>
+              <p14:cNvPr id="4" name="Ink 3">
+                <a:extLst>
+                  <a:ext uri="{FF2B5EF4-FFF2-40B4-BE49-F238E27FC236}">
+                    <a16:creationId xmlns:a16="http://schemas.microsoft.com/office/drawing/2014/main" id="{F800015F-6BE8-42EF-99D5-FB3AECB47FD7}"/>
+                  </a:ext>
+                </a:extLst>
+              </p14:cNvPr>
+              <p14:cNvContentPartPr/>
+              <p14:nvPr/>
+            </p14:nvContentPartPr>
+            <p14:xfrm>
+              <a:off x="847729" y="1731139"/>
+              <a:ext cx="1046520" cy="35280"/>
+            </p14:xfrm>
+          </p:contentPart>
+        </mc:Choice>
+        <mc:Fallback>
+          <p:pic>
+            <p:nvPicPr>
+              <p:cNvPr id="4" name="Ink 3">
+                <a:extLst>
+                  <a:ext uri="{FF2B5EF4-FFF2-40B4-BE49-F238E27FC236}">
+                    <a16:creationId xmlns:a16="http://schemas.microsoft.com/office/drawing/2014/main" id="{F800015F-6BE8-42EF-99D5-FB3AECB47FD7}"/>
+                  </a:ext>
+                </a:extLst>
+              </p:cNvPr>
+              <p:cNvPicPr/>
+              <p:nvPr/>
+            </p:nvPicPr>
+            <p:blipFill>
+              <a:blip r:embed="rId3"/>
+              <a:stretch>
+                <a:fillRect/>
+              </a:stretch>
+            </p:blipFill>
+            <p:spPr>
+              <a:xfrm>
+                <a:off x="838729" y="1722499"/>
+                <a:ext cx="1064160" cy="52920"/>
+              </a:xfrm>
+              <a:prstGeom prst="rect">
+                <a:avLst/>
+              </a:prstGeom>
+            </p:spPr>
+          </p:pic>
+        </mc:Fallback>
+      </mc:AlternateContent>
+      <mc:AlternateContent xmlns:mc="http://schemas.openxmlformats.org/markup-compatibility/2006">
+        <mc:Choice xmlns:p14="http://schemas.microsoft.com/office/powerpoint/2010/main" Requires="p14">
+          <p:contentPart p14:bwMode="auto" r:id="rId4">
+            <p14:nvContentPartPr>
+              <p14:cNvPr id="5" name="Ink 4">
+                <a:extLst>
+                  <a:ext uri="{FF2B5EF4-FFF2-40B4-BE49-F238E27FC236}">
+                    <a16:creationId xmlns:a16="http://schemas.microsoft.com/office/drawing/2014/main" id="{CA30D431-F8FF-4569-BBFD-F0F743AD181E}"/>
+                  </a:ext>
+                </a:extLst>
+              </p14:cNvPr>
+              <p14:cNvContentPartPr/>
+              <p14:nvPr/>
+            </p14:nvContentPartPr>
+            <p14:xfrm>
+              <a:off x="3166849" y="1159819"/>
+              <a:ext cx="140760" cy="198720"/>
+            </p14:xfrm>
+          </p:contentPart>
+        </mc:Choice>
+        <mc:Fallback>
+          <p:pic>
+            <p:nvPicPr>
+              <p:cNvPr id="5" name="Ink 4">
+                <a:extLst>
+                  <a:ext uri="{FF2B5EF4-FFF2-40B4-BE49-F238E27FC236}">
+                    <a16:creationId xmlns:a16="http://schemas.microsoft.com/office/drawing/2014/main" id="{CA30D431-F8FF-4569-BBFD-F0F743AD181E}"/>
+                  </a:ext>
+                </a:extLst>
+              </p:cNvPr>
+              <p:cNvPicPr/>
+              <p:nvPr/>
+            </p:nvPicPr>
+            <p:blipFill>
+              <a:blip r:embed="rId5"/>
+              <a:stretch>
+                <a:fillRect/>
+              </a:stretch>
+            </p:blipFill>
+            <p:spPr>
+              <a:xfrm>
+                <a:off x="3157849" y="1151179"/>
+                <a:ext cx="158400" cy="216360"/>
+              </a:xfrm>
+              <a:prstGeom prst="rect">
+                <a:avLst/>
+              </a:prstGeom>
+            </p:spPr>
+          </p:pic>
+        </mc:Fallback>
+      </mc:AlternateContent>
+      <mc:AlternateContent xmlns:mc="http://schemas.openxmlformats.org/markup-compatibility/2006">
+        <mc:Choice xmlns:p14="http://schemas.microsoft.com/office/powerpoint/2010/main" Requires="p14">
+          <p:contentPart p14:bwMode="auto" r:id="rId6">
+            <p14:nvContentPartPr>
+              <p14:cNvPr id="6" name="Ink 5">
+                <a:extLst>
+                  <a:ext uri="{FF2B5EF4-FFF2-40B4-BE49-F238E27FC236}">
+                    <a16:creationId xmlns:a16="http://schemas.microsoft.com/office/drawing/2014/main" id="{96B87631-233A-4696-87C9-E48F252BE037}"/>
+                  </a:ext>
+                </a:extLst>
+              </p14:cNvPr>
+              <p14:cNvContentPartPr/>
+              <p14:nvPr/>
+            </p14:nvContentPartPr>
+            <p14:xfrm>
+              <a:off x="874729" y="2135779"/>
+              <a:ext cx="621000" cy="19800"/>
+            </p14:xfrm>
+          </p:contentPart>
+        </mc:Choice>
+        <mc:Fallback>
+          <p:pic>
+            <p:nvPicPr>
+              <p:cNvPr id="6" name="Ink 5">
+                <a:extLst>
+                  <a:ext uri="{FF2B5EF4-FFF2-40B4-BE49-F238E27FC236}">
+                    <a16:creationId xmlns:a16="http://schemas.microsoft.com/office/drawing/2014/main" id="{96B87631-233A-4696-87C9-E48F252BE037}"/>
+                  </a:ext>
+                </a:extLst>
+              </p:cNvPr>
+              <p:cNvPicPr/>
+              <p:nvPr/>
+            </p:nvPicPr>
+            <p:blipFill>
+              <a:blip r:embed="rId7"/>
+              <a:stretch>
+                <a:fillRect/>
+              </a:stretch>
+            </p:blipFill>
+            <p:spPr>
+              <a:xfrm>
+                <a:off x="865729" y="2127139"/>
+                <a:ext cx="638640" cy="37440"/>
+              </a:xfrm>
+              <a:prstGeom prst="rect">
+                <a:avLst/>
+              </a:prstGeom>
+            </p:spPr>
+          </p:pic>
+        </mc:Fallback>
+      </mc:AlternateContent>
+      <mc:AlternateContent xmlns:mc="http://schemas.openxmlformats.org/markup-compatibility/2006">
+        <mc:Choice xmlns:p14="http://schemas.microsoft.com/office/powerpoint/2010/main" Requires="p14">
+          <p:contentPart p14:bwMode="auto" r:id="rId8">
+            <p14:nvContentPartPr>
+              <p14:cNvPr id="7" name="Ink 6">
+                <a:extLst>
+                  <a:ext uri="{FF2B5EF4-FFF2-40B4-BE49-F238E27FC236}">
+                    <a16:creationId xmlns:a16="http://schemas.microsoft.com/office/drawing/2014/main" id="{95FBF6D9-F415-4D6B-9AEE-97848ED874C0}"/>
+                  </a:ext>
+                </a:extLst>
+              </p14:cNvPr>
+              <p14:cNvContentPartPr/>
+              <p14:nvPr/>
+            </p14:nvContentPartPr>
+            <p14:xfrm>
+              <a:off x="3724129" y="2133979"/>
+              <a:ext cx="657360" cy="25920"/>
+            </p14:xfrm>
+          </p:contentPart>
+        </mc:Choice>
+        <mc:Fallback>
+          <p:pic>
+            <p:nvPicPr>
+              <p:cNvPr id="7" name="Ink 6">
+                <a:extLst>
+                  <a:ext uri="{FF2B5EF4-FFF2-40B4-BE49-F238E27FC236}">
+                    <a16:creationId xmlns:a16="http://schemas.microsoft.com/office/drawing/2014/main" id="{95FBF6D9-F415-4D6B-9AEE-97848ED874C0}"/>
+                  </a:ext>
+                </a:extLst>
+              </p:cNvPr>
+              <p:cNvPicPr/>
+              <p:nvPr/>
+            </p:nvPicPr>
+            <p:blipFill>
+              <a:blip r:embed="rId9"/>
+              <a:stretch>
+                <a:fillRect/>
+              </a:stretch>
+            </p:blipFill>
+            <p:spPr>
+              <a:xfrm>
+                <a:off x="3715129" y="2125339"/>
+                <a:ext cx="675000" cy="43560"/>
+              </a:xfrm>
+              <a:prstGeom prst="rect">
+                <a:avLst/>
+              </a:prstGeom>
+            </p:spPr>
+          </p:pic>
+        </mc:Fallback>
+      </mc:AlternateContent>
+      <mc:AlternateContent xmlns:mc="http://schemas.openxmlformats.org/markup-compatibility/2006">
+        <mc:Choice xmlns:p14="http://schemas.microsoft.com/office/powerpoint/2010/main" Requires="p14">
+          <p:contentPart p14:bwMode="auto" r:id="rId10">
+            <p14:nvContentPartPr>
+              <p14:cNvPr id="8" name="Ink 7">
+                <a:extLst>
+                  <a:ext uri="{FF2B5EF4-FFF2-40B4-BE49-F238E27FC236}">
+                    <a16:creationId xmlns:a16="http://schemas.microsoft.com/office/drawing/2014/main" id="{D775531D-8809-4C8E-AB7B-3A972C44D4D6}"/>
+                  </a:ext>
+                </a:extLst>
+              </p14:cNvPr>
+              <p14:cNvContentPartPr/>
+              <p14:nvPr/>
+            </p14:nvContentPartPr>
+            <p14:xfrm>
+              <a:off x="4440889" y="1915099"/>
+              <a:ext cx="299880" cy="126720"/>
+            </p14:xfrm>
+          </p:contentPart>
+        </mc:Choice>
+        <mc:Fallback>
+          <p:pic>
+            <p:nvPicPr>
+              <p:cNvPr id="8" name="Ink 7">
+                <a:extLst>
+                  <a:ext uri="{FF2B5EF4-FFF2-40B4-BE49-F238E27FC236}">
+                    <a16:creationId xmlns:a16="http://schemas.microsoft.com/office/drawing/2014/main" id="{D775531D-8809-4C8E-AB7B-3A972C44D4D6}"/>
+                  </a:ext>
+                </a:extLst>
+              </p:cNvPr>
+              <p:cNvPicPr/>
+              <p:nvPr/>
+            </p:nvPicPr>
+            <p:blipFill>
+              <a:blip r:embed="rId11"/>
+              <a:stretch>
+                <a:fillRect/>
+              </a:stretch>
+            </p:blipFill>
+            <p:spPr>
+              <a:xfrm>
+                <a:off x="4432249" y="1906459"/>
+                <a:ext cx="317520" cy="144360"/>
+              </a:xfrm>
+              <a:prstGeom prst="rect">
+                <a:avLst/>
+              </a:prstGeom>
+            </p:spPr>
+          </p:pic>
+        </mc:Fallback>
+      </mc:AlternateContent>
+      <mc:AlternateContent xmlns:mc="http://schemas.openxmlformats.org/markup-compatibility/2006">
+        <mc:Choice xmlns:p14="http://schemas.microsoft.com/office/powerpoint/2010/main" Requires="p14">
+          <p:contentPart p14:bwMode="auto" r:id="rId12">
+            <p14:nvContentPartPr>
+              <p14:cNvPr id="9" name="Ink 8">
+                <a:extLst>
+                  <a:ext uri="{FF2B5EF4-FFF2-40B4-BE49-F238E27FC236}">
+                    <a16:creationId xmlns:a16="http://schemas.microsoft.com/office/drawing/2014/main" id="{53EF766D-400B-441A-AE49-E8AEE58A3483}"/>
+                  </a:ext>
+                </a:extLst>
+              </p14:cNvPr>
+              <p14:cNvContentPartPr/>
+              <p14:nvPr/>
+            </p14:nvContentPartPr>
+            <p14:xfrm>
+              <a:off x="4852369" y="1862179"/>
+              <a:ext cx="120960" cy="239040"/>
+            </p14:xfrm>
+          </p:contentPart>
+        </mc:Choice>
+        <mc:Fallback>
+          <p:pic>
+            <p:nvPicPr>
+              <p:cNvPr id="9" name="Ink 8">
+                <a:extLst>
+                  <a:ext uri="{FF2B5EF4-FFF2-40B4-BE49-F238E27FC236}">
+                    <a16:creationId xmlns:a16="http://schemas.microsoft.com/office/drawing/2014/main" id="{53EF766D-400B-441A-AE49-E8AEE58A3483}"/>
+                  </a:ext>
+                </a:extLst>
+              </p:cNvPr>
+              <p:cNvPicPr/>
+              <p:nvPr/>
+            </p:nvPicPr>
+            <p:blipFill>
+              <a:blip r:embed="rId13"/>
+              <a:stretch>
+                <a:fillRect/>
+              </a:stretch>
+            </p:blipFill>
+            <p:spPr>
+              <a:xfrm>
+                <a:off x="4843729" y="1853539"/>
+                <a:ext cx="138600" cy="256680"/>
+              </a:xfrm>
+              <a:prstGeom prst="rect">
+                <a:avLst/>
+              </a:prstGeom>
+            </p:spPr>
+          </p:pic>
+        </mc:Fallback>
+      </mc:AlternateContent>
+      <mc:AlternateContent xmlns:mc="http://schemas.openxmlformats.org/markup-compatibility/2006">
+        <mc:Choice xmlns:p14="http://schemas.microsoft.com/office/powerpoint/2010/main" Requires="p14">
+          <p:contentPart p14:bwMode="auto" r:id="rId14">
+            <p14:nvContentPartPr>
+              <p14:cNvPr id="10" name="Ink 9">
+                <a:extLst>
+                  <a:ext uri="{FF2B5EF4-FFF2-40B4-BE49-F238E27FC236}">
+                    <a16:creationId xmlns:a16="http://schemas.microsoft.com/office/drawing/2014/main" id="{A6ED9F73-B255-44BA-8DEB-216A3117EC81}"/>
+                  </a:ext>
+                </a:extLst>
+              </p14:cNvPr>
+              <p14:cNvContentPartPr/>
+              <p14:nvPr/>
+            </p14:nvContentPartPr>
+            <p14:xfrm>
+              <a:off x="5027689" y="1867939"/>
+              <a:ext cx="149400" cy="114480"/>
+            </p14:xfrm>
+          </p:contentPart>
+        </mc:Choice>
+        <mc:Fallback>
+          <p:pic>
+            <p:nvPicPr>
+              <p:cNvPr id="10" name="Ink 9">
+                <a:extLst>
+                  <a:ext uri="{FF2B5EF4-FFF2-40B4-BE49-F238E27FC236}">
+                    <a16:creationId xmlns:a16="http://schemas.microsoft.com/office/drawing/2014/main" id="{A6ED9F73-B255-44BA-8DEB-216A3117EC81}"/>
+                  </a:ext>
+                </a:extLst>
+              </p:cNvPr>
+              <p:cNvPicPr/>
+              <p:nvPr/>
+            </p:nvPicPr>
+            <p:blipFill>
+              <a:blip r:embed="rId15"/>
+              <a:stretch>
+                <a:fillRect/>
+              </a:stretch>
+            </p:blipFill>
+            <p:spPr>
+              <a:xfrm>
+                <a:off x="5019049" y="1858939"/>
+                <a:ext cx="167040" cy="132120"/>
+              </a:xfrm>
+              <a:prstGeom prst="rect">
+                <a:avLst/>
+              </a:prstGeom>
+            </p:spPr>
+          </p:pic>
+        </mc:Fallback>
+      </mc:AlternateContent>
+      <mc:AlternateContent xmlns:mc="http://schemas.openxmlformats.org/markup-compatibility/2006">
+        <mc:Choice xmlns:p14="http://schemas.microsoft.com/office/powerpoint/2010/main" Requires="p14">
+          <p:contentPart p14:bwMode="auto" r:id="rId16">
+            <p14:nvContentPartPr>
+              <p14:cNvPr id="11" name="Ink 10">
+                <a:extLst>
+                  <a:ext uri="{FF2B5EF4-FFF2-40B4-BE49-F238E27FC236}">
+                    <a16:creationId xmlns:a16="http://schemas.microsoft.com/office/drawing/2014/main" id="{E94A8F32-D4AF-475D-AD12-FB6A81B823B8}"/>
+                  </a:ext>
+                </a:extLst>
+              </p14:cNvPr>
+              <p14:cNvContentPartPr/>
+              <p14:nvPr/>
+            </p14:nvContentPartPr>
+            <p14:xfrm>
+              <a:off x="5175649" y="1865419"/>
+              <a:ext cx="127440" cy="105120"/>
+            </p14:xfrm>
+          </p:contentPart>
+        </mc:Choice>
+        <mc:Fallback>
+          <p:pic>
+            <p:nvPicPr>
+              <p:cNvPr id="11" name="Ink 10">
+                <a:extLst>
+                  <a:ext uri="{FF2B5EF4-FFF2-40B4-BE49-F238E27FC236}">
+                    <a16:creationId xmlns:a16="http://schemas.microsoft.com/office/drawing/2014/main" id="{E94A8F32-D4AF-475D-AD12-FB6A81B823B8}"/>
+                  </a:ext>
+                </a:extLst>
+              </p:cNvPr>
+              <p:cNvPicPr/>
+              <p:nvPr/>
+            </p:nvPicPr>
+            <p:blipFill>
+              <a:blip r:embed="rId17"/>
+              <a:stretch>
+                <a:fillRect/>
+              </a:stretch>
+            </p:blipFill>
+            <p:spPr>
+              <a:xfrm>
+                <a:off x="5166649" y="1856419"/>
+                <a:ext cx="145080" cy="122760"/>
+              </a:xfrm>
+              <a:prstGeom prst="rect">
+                <a:avLst/>
+              </a:prstGeom>
+            </p:spPr>
+          </p:pic>
+        </mc:Fallback>
+      </mc:AlternateContent>
+      <mc:AlternateContent xmlns:mc="http://schemas.openxmlformats.org/markup-compatibility/2006">
+        <mc:Choice xmlns:p14="http://schemas.microsoft.com/office/powerpoint/2010/main" Requires="p14">
+          <p:contentPart p14:bwMode="auto" r:id="rId18">
+            <p14:nvContentPartPr>
+              <p14:cNvPr id="12" name="Ink 11">
+                <a:extLst>
+                  <a:ext uri="{FF2B5EF4-FFF2-40B4-BE49-F238E27FC236}">
+                    <a16:creationId xmlns:a16="http://schemas.microsoft.com/office/drawing/2014/main" id="{A13A683C-ED75-4A57-977A-7371475ECC8D}"/>
+                  </a:ext>
+                </a:extLst>
+              </p14:cNvPr>
+              <p14:cNvContentPartPr/>
+              <p14:nvPr/>
+            </p14:nvContentPartPr>
+            <p14:xfrm>
+              <a:off x="5312449" y="1735099"/>
+              <a:ext cx="184320" cy="249840"/>
+            </p14:xfrm>
+          </p:contentPart>
+        </mc:Choice>
+        <mc:Fallback>
+          <p:pic>
+            <p:nvPicPr>
+              <p:cNvPr id="12" name="Ink 11">
+                <a:extLst>
+                  <a:ext uri="{FF2B5EF4-FFF2-40B4-BE49-F238E27FC236}">
+                    <a16:creationId xmlns:a16="http://schemas.microsoft.com/office/drawing/2014/main" id="{A13A683C-ED75-4A57-977A-7371475ECC8D}"/>
+                  </a:ext>
+                </a:extLst>
+              </p:cNvPr>
+              <p:cNvPicPr/>
+              <p:nvPr/>
+            </p:nvPicPr>
+            <p:blipFill>
+              <a:blip r:embed="rId19"/>
+              <a:stretch>
+                <a:fillRect/>
+              </a:stretch>
+            </p:blipFill>
+            <p:spPr>
+              <a:xfrm>
+                <a:off x="5303449" y="1726459"/>
+                <a:ext cx="201960" cy="267480"/>
+              </a:xfrm>
+              <a:prstGeom prst="rect">
+                <a:avLst/>
+              </a:prstGeom>
+            </p:spPr>
+          </p:pic>
+        </mc:Fallback>
+      </mc:AlternateContent>
+      <mc:AlternateContent xmlns:mc="http://schemas.openxmlformats.org/markup-compatibility/2006">
+        <mc:Choice xmlns:p14="http://schemas.microsoft.com/office/powerpoint/2010/main" Requires="p14">
+          <p:contentPart p14:bwMode="auto" r:id="rId20">
+            <p14:nvContentPartPr>
+              <p14:cNvPr id="13" name="Ink 12">
+                <a:extLst>
+                  <a:ext uri="{FF2B5EF4-FFF2-40B4-BE49-F238E27FC236}">
+                    <a16:creationId xmlns:a16="http://schemas.microsoft.com/office/drawing/2014/main" id="{CC856906-A24D-44F3-915F-EAA7C94EADA4}"/>
+                  </a:ext>
+                </a:extLst>
+              </p14:cNvPr>
+              <p14:cNvContentPartPr/>
+              <p14:nvPr/>
+            </p14:nvContentPartPr>
+            <p14:xfrm>
+              <a:off x="5516209" y="1857859"/>
+              <a:ext cx="56160" cy="120600"/>
+            </p14:xfrm>
+          </p:contentPart>
+        </mc:Choice>
+        <mc:Fallback>
+          <p:pic>
+            <p:nvPicPr>
+              <p:cNvPr id="13" name="Ink 12">
+                <a:extLst>
+                  <a:ext uri="{FF2B5EF4-FFF2-40B4-BE49-F238E27FC236}">
+                    <a16:creationId xmlns:a16="http://schemas.microsoft.com/office/drawing/2014/main" id="{CC856906-A24D-44F3-915F-EAA7C94EADA4}"/>
+                  </a:ext>
+                </a:extLst>
+              </p:cNvPr>
+              <p:cNvPicPr/>
+              <p:nvPr/>
+            </p:nvPicPr>
+            <p:blipFill>
+              <a:blip r:embed="rId21"/>
+              <a:stretch>
+                <a:fillRect/>
+              </a:stretch>
+            </p:blipFill>
+            <p:spPr>
+              <a:xfrm>
+                <a:off x="5507569" y="1849219"/>
+                <a:ext cx="73800" cy="138240"/>
+              </a:xfrm>
+              <a:prstGeom prst="rect">
+                <a:avLst/>
+              </a:prstGeom>
+            </p:spPr>
+          </p:pic>
+        </mc:Fallback>
+      </mc:AlternateContent>
+      <mc:AlternateContent xmlns:mc="http://schemas.openxmlformats.org/markup-compatibility/2006">
+        <mc:Choice xmlns:p14="http://schemas.microsoft.com/office/powerpoint/2010/main" Requires="p14">
+          <p:contentPart p14:bwMode="auto" r:id="rId22">
+            <p14:nvContentPartPr>
+              <p14:cNvPr id="14" name="Ink 13">
+                <a:extLst>
+                  <a:ext uri="{FF2B5EF4-FFF2-40B4-BE49-F238E27FC236}">
+                    <a16:creationId xmlns:a16="http://schemas.microsoft.com/office/drawing/2014/main" id="{DE0907E5-956D-4A03-8C3D-1DF6C9510984}"/>
+                  </a:ext>
+                </a:extLst>
+              </p14:cNvPr>
+              <p14:cNvContentPartPr/>
+              <p14:nvPr/>
+            </p14:nvContentPartPr>
+            <p14:xfrm>
+              <a:off x="5614849" y="1873699"/>
+              <a:ext cx="73440" cy="107640"/>
+            </p14:xfrm>
+          </p:contentPart>
+        </mc:Choice>
+        <mc:Fallback>
+          <p:pic>
+            <p:nvPicPr>
+              <p:cNvPr id="14" name="Ink 13">
+                <a:extLst>
+                  <a:ext uri="{FF2B5EF4-FFF2-40B4-BE49-F238E27FC236}">
+                    <a16:creationId xmlns:a16="http://schemas.microsoft.com/office/drawing/2014/main" id="{DE0907E5-956D-4A03-8C3D-1DF6C9510984}"/>
+                  </a:ext>
+                </a:extLst>
+              </p:cNvPr>
+              <p:cNvPicPr/>
+              <p:nvPr/>
+            </p:nvPicPr>
+            <p:blipFill>
+              <a:blip r:embed="rId23"/>
+              <a:stretch>
+                <a:fillRect/>
+              </a:stretch>
+            </p:blipFill>
+            <p:spPr>
+              <a:xfrm>
+                <a:off x="5606209" y="1865059"/>
+                <a:ext cx="91080" cy="125280"/>
+              </a:xfrm>
+              <a:prstGeom prst="rect">
+                <a:avLst/>
+              </a:prstGeom>
+            </p:spPr>
+          </p:pic>
+        </mc:Fallback>
+      </mc:AlternateContent>
+      <mc:AlternateContent xmlns:mc="http://schemas.openxmlformats.org/markup-compatibility/2006">
+        <mc:Choice xmlns:p14="http://schemas.microsoft.com/office/powerpoint/2010/main" Requires="p14">
+          <p:contentPart p14:bwMode="auto" r:id="rId24">
+            <p14:nvContentPartPr>
+              <p14:cNvPr id="15" name="Ink 14">
+                <a:extLst>
+                  <a:ext uri="{FF2B5EF4-FFF2-40B4-BE49-F238E27FC236}">
+                    <a16:creationId xmlns:a16="http://schemas.microsoft.com/office/drawing/2014/main" id="{97C5DFCF-FE20-49B5-8193-A829A76114FF}"/>
+                  </a:ext>
+                </a:extLst>
+              </p14:cNvPr>
+              <p14:cNvContentPartPr/>
+              <p14:nvPr/>
+            </p14:nvContentPartPr>
+            <p14:xfrm>
+              <a:off x="5760289" y="1835899"/>
+              <a:ext cx="108360" cy="103680"/>
+            </p14:xfrm>
+          </p:contentPart>
+        </mc:Choice>
+        <mc:Fallback>
+          <p:pic>
+            <p:nvPicPr>
+              <p:cNvPr id="15" name="Ink 14">
+                <a:extLst>
+                  <a:ext uri="{FF2B5EF4-FFF2-40B4-BE49-F238E27FC236}">
+                    <a16:creationId xmlns:a16="http://schemas.microsoft.com/office/drawing/2014/main" id="{97C5DFCF-FE20-49B5-8193-A829A76114FF}"/>
+                  </a:ext>
+                </a:extLst>
+              </p:cNvPr>
+              <p:cNvPicPr/>
+              <p:nvPr/>
+            </p:nvPicPr>
+            <p:blipFill>
+              <a:blip r:embed="rId25"/>
+              <a:stretch>
+                <a:fillRect/>
+              </a:stretch>
+            </p:blipFill>
+            <p:spPr>
+              <a:xfrm>
+                <a:off x="5751649" y="1826899"/>
+                <a:ext cx="126000" cy="121320"/>
+              </a:xfrm>
+              <a:prstGeom prst="rect">
+                <a:avLst/>
+              </a:prstGeom>
+            </p:spPr>
+          </p:pic>
+        </mc:Fallback>
+      </mc:AlternateContent>
+      <mc:AlternateContent xmlns:mc="http://schemas.openxmlformats.org/markup-compatibility/2006">
+        <mc:Choice xmlns:p14="http://schemas.microsoft.com/office/powerpoint/2010/main" Requires="p14">
+          <p:contentPart p14:bwMode="auto" r:id="rId26">
+            <p14:nvContentPartPr>
+              <p14:cNvPr id="16" name="Ink 15">
+                <a:extLst>
+                  <a:ext uri="{FF2B5EF4-FFF2-40B4-BE49-F238E27FC236}">
+                    <a16:creationId xmlns:a16="http://schemas.microsoft.com/office/drawing/2014/main" id="{F9DEE218-AD91-460E-8801-8E1AB75F6200}"/>
+                  </a:ext>
+                </a:extLst>
+              </p14:cNvPr>
+              <p14:cNvContentPartPr/>
+              <p14:nvPr/>
+            </p14:nvContentPartPr>
+            <p14:xfrm>
+              <a:off x="5841289" y="1867219"/>
+              <a:ext cx="88560" cy="81720"/>
+            </p14:xfrm>
+          </p:contentPart>
+        </mc:Choice>
+        <mc:Fallback>
+          <p:pic>
+            <p:nvPicPr>
+              <p:cNvPr id="16" name="Ink 15">
+                <a:extLst>
+                  <a:ext uri="{FF2B5EF4-FFF2-40B4-BE49-F238E27FC236}">
+                    <a16:creationId xmlns:a16="http://schemas.microsoft.com/office/drawing/2014/main" id="{F9DEE218-AD91-460E-8801-8E1AB75F6200}"/>
+                  </a:ext>
+                </a:extLst>
+              </p:cNvPr>
+              <p:cNvPicPr/>
+              <p:nvPr/>
+            </p:nvPicPr>
+            <p:blipFill>
+              <a:blip r:embed="rId27"/>
+              <a:stretch>
+                <a:fillRect/>
+              </a:stretch>
+            </p:blipFill>
+            <p:spPr>
+              <a:xfrm>
+                <a:off x="5832289" y="1858579"/>
+                <a:ext cx="106200" cy="99360"/>
+              </a:xfrm>
+              <a:prstGeom prst="rect">
+                <a:avLst/>
+              </a:prstGeom>
+            </p:spPr>
+          </p:pic>
+        </mc:Fallback>
+      </mc:AlternateContent>
+      <mc:AlternateContent xmlns:mc="http://schemas.openxmlformats.org/markup-compatibility/2006">
+        <mc:Choice xmlns:p14="http://schemas.microsoft.com/office/powerpoint/2010/main" Requires="p14">
+          <p:contentPart p14:bwMode="auto" r:id="rId28">
+            <p14:nvContentPartPr>
+              <p14:cNvPr id="17" name="Ink 16">
+                <a:extLst>
+                  <a:ext uri="{FF2B5EF4-FFF2-40B4-BE49-F238E27FC236}">
+                    <a16:creationId xmlns:a16="http://schemas.microsoft.com/office/drawing/2014/main" id="{80C7621E-CD68-4C80-B010-6F4CA9EF8567}"/>
+                  </a:ext>
+                </a:extLst>
+              </p14:cNvPr>
+              <p14:cNvContentPartPr/>
+              <p14:nvPr/>
+            </p14:nvContentPartPr>
+            <p14:xfrm>
+              <a:off x="5941369" y="1852459"/>
+              <a:ext cx="122760" cy="186120"/>
+            </p14:xfrm>
+          </p:contentPart>
+        </mc:Choice>
+        <mc:Fallback>
+          <p:pic>
+            <p:nvPicPr>
+              <p:cNvPr id="17" name="Ink 16">
+                <a:extLst>
+                  <a:ext uri="{FF2B5EF4-FFF2-40B4-BE49-F238E27FC236}">
+                    <a16:creationId xmlns:a16="http://schemas.microsoft.com/office/drawing/2014/main" id="{80C7621E-CD68-4C80-B010-6F4CA9EF8567}"/>
+                  </a:ext>
+                </a:extLst>
+              </p:cNvPr>
+              <p:cNvPicPr/>
+              <p:nvPr/>
+            </p:nvPicPr>
+            <p:blipFill>
+              <a:blip r:embed="rId29"/>
+              <a:stretch>
+                <a:fillRect/>
+              </a:stretch>
+            </p:blipFill>
+            <p:spPr>
+              <a:xfrm>
+                <a:off x="5932369" y="1843459"/>
+                <a:ext cx="140400" cy="203760"/>
+              </a:xfrm>
+              <a:prstGeom prst="rect">
+                <a:avLst/>
+              </a:prstGeom>
+            </p:spPr>
+          </p:pic>
+        </mc:Fallback>
+      </mc:AlternateContent>
+      <mc:AlternateContent xmlns:mc="http://schemas.openxmlformats.org/markup-compatibility/2006">
+        <mc:Choice xmlns:p14="http://schemas.microsoft.com/office/powerpoint/2010/main" Requires="p14">
+          <p:contentPart p14:bwMode="auto" r:id="rId30">
+            <p14:nvContentPartPr>
+              <p14:cNvPr id="18" name="Ink 17">
+                <a:extLst>
+                  <a:ext uri="{FF2B5EF4-FFF2-40B4-BE49-F238E27FC236}">
+                    <a16:creationId xmlns:a16="http://schemas.microsoft.com/office/drawing/2014/main" id="{44D28F5B-F745-4230-9118-CA5B66F857C5}"/>
+                  </a:ext>
+                </a:extLst>
+              </p14:cNvPr>
+              <p14:cNvContentPartPr/>
+              <p14:nvPr/>
+            </p14:nvContentPartPr>
+            <p14:xfrm>
+              <a:off x="6082129" y="1855339"/>
+              <a:ext cx="101880" cy="129240"/>
+            </p14:xfrm>
+          </p:contentPart>
+        </mc:Choice>
+        <mc:Fallback>
+          <p:pic>
+            <p:nvPicPr>
+              <p:cNvPr id="18" name="Ink 17">
+                <a:extLst>
+                  <a:ext uri="{FF2B5EF4-FFF2-40B4-BE49-F238E27FC236}">
+                    <a16:creationId xmlns:a16="http://schemas.microsoft.com/office/drawing/2014/main" id="{44D28F5B-F745-4230-9118-CA5B66F857C5}"/>
+                  </a:ext>
+                </a:extLst>
+              </p:cNvPr>
+              <p:cNvPicPr/>
+              <p:nvPr/>
+            </p:nvPicPr>
+            <p:blipFill>
+              <a:blip r:embed="rId31"/>
+              <a:stretch>
+                <a:fillRect/>
+              </a:stretch>
+            </p:blipFill>
+            <p:spPr>
+              <a:xfrm>
+                <a:off x="6073489" y="1846339"/>
+                <a:ext cx="119520" cy="146880"/>
+              </a:xfrm>
+              <a:prstGeom prst="rect">
+                <a:avLst/>
+              </a:prstGeom>
+            </p:spPr>
+          </p:pic>
+        </mc:Fallback>
+      </mc:AlternateContent>
+      <mc:AlternateContent xmlns:mc="http://schemas.openxmlformats.org/markup-compatibility/2006">
+        <mc:Choice xmlns:p14="http://schemas.microsoft.com/office/powerpoint/2010/main" Requires="p14">
+          <p:contentPart p14:bwMode="auto" r:id="rId32">
+            <p14:nvContentPartPr>
+              <p14:cNvPr id="21" name="Ink 20">
+                <a:extLst>
+                  <a:ext uri="{FF2B5EF4-FFF2-40B4-BE49-F238E27FC236}">
+                    <a16:creationId xmlns:a16="http://schemas.microsoft.com/office/drawing/2014/main" id="{81ADF5CC-D6BF-4407-9C57-08763A571AB3}"/>
+                  </a:ext>
+                </a:extLst>
+              </p14:cNvPr>
+              <p14:cNvContentPartPr/>
+              <p14:nvPr/>
+            </p14:nvContentPartPr>
+            <p14:xfrm>
+              <a:off x="868609" y="2569579"/>
+              <a:ext cx="432360" cy="24840"/>
+            </p14:xfrm>
+          </p:contentPart>
+        </mc:Choice>
+        <mc:Fallback>
+          <p:pic>
+            <p:nvPicPr>
+              <p:cNvPr id="21" name="Ink 20">
+                <a:extLst>
+                  <a:ext uri="{FF2B5EF4-FFF2-40B4-BE49-F238E27FC236}">
+                    <a16:creationId xmlns:a16="http://schemas.microsoft.com/office/drawing/2014/main" id="{81ADF5CC-D6BF-4407-9C57-08763A571AB3}"/>
+                  </a:ext>
+                </a:extLst>
+              </p:cNvPr>
+              <p:cNvPicPr/>
+              <p:nvPr/>
+            </p:nvPicPr>
+            <p:blipFill>
+              <a:blip r:embed="rId33"/>
+              <a:stretch>
+                <a:fillRect/>
+              </a:stretch>
+            </p:blipFill>
+            <p:spPr>
+              <a:xfrm>
+                <a:off x="859969" y="2560579"/>
+                <a:ext cx="450000" cy="42480"/>
+              </a:xfrm>
+              <a:prstGeom prst="rect">
+                <a:avLst/>
+              </a:prstGeom>
+            </p:spPr>
+          </p:pic>
+        </mc:Fallback>
+      </mc:AlternateContent>
+      <p:grpSp>
+        <p:nvGrpSpPr>
+          <p:cNvPr id="25" name="Group 24">
+            <a:extLst>
+              <a:ext uri="{FF2B5EF4-FFF2-40B4-BE49-F238E27FC236}">
+                <a16:creationId xmlns:a16="http://schemas.microsoft.com/office/drawing/2014/main" id="{D57FE008-4541-43D3-8853-7C05074C889A}"/>
+              </a:ext>
+            </a:extLst>
+          </p:cNvPr>
+          <p:cNvGrpSpPr/>
+          <p:nvPr/>
+        </p:nvGrpSpPr>
+        <p:grpSpPr>
+          <a:xfrm>
+            <a:off x="1073089" y="2997979"/>
+            <a:ext cx="132480" cy="259560"/>
+            <a:chOff x="1073089" y="2997979"/>
+            <a:chExt cx="132480" cy="259560"/>
+          </a:xfrm>
+        </p:grpSpPr>
+        <mc:AlternateContent xmlns:mc="http://schemas.openxmlformats.org/markup-compatibility/2006">
+          <mc:Choice xmlns:p14="http://schemas.microsoft.com/office/powerpoint/2010/main" Requires="p14">
+            <p:contentPart p14:bwMode="auto" r:id="rId34">
+              <p14:nvContentPartPr>
+                <p14:cNvPr id="23" name="Ink 22">
+                  <a:extLst>
+                    <a:ext uri="{FF2B5EF4-FFF2-40B4-BE49-F238E27FC236}">
+                      <a16:creationId xmlns:a16="http://schemas.microsoft.com/office/drawing/2014/main" id="{5E332486-0F24-4462-A4B3-299E43BAE3EB}"/>
+                    </a:ext>
+                  </a:extLst>
+                </p14:cNvPr>
+                <p14:cNvContentPartPr/>
+                <p14:nvPr/>
+              </p14:nvContentPartPr>
+              <p14:xfrm>
+                <a:off x="1114489" y="3049819"/>
+                <a:ext cx="17640" cy="207720"/>
+              </p14:xfrm>
+            </p:contentPart>
+          </mc:Choice>
+          <mc:Fallback>
+            <p:pic>
+              <p:nvPicPr>
+                <p:cNvPr id="23" name="Ink 22">
+                  <a:extLst>
+                    <a:ext uri="{FF2B5EF4-FFF2-40B4-BE49-F238E27FC236}">
+                      <a16:creationId xmlns:a16="http://schemas.microsoft.com/office/drawing/2014/main" id="{5E332486-0F24-4462-A4B3-299E43BAE3EB}"/>
+                    </a:ext>
+                  </a:extLst>
+                </p:cNvPr>
+                <p:cNvPicPr/>
+                <p:nvPr/>
+              </p:nvPicPr>
+              <p:blipFill>
+                <a:blip r:embed="rId35"/>
+                <a:stretch>
+                  <a:fillRect/>
+                </a:stretch>
+              </p:blipFill>
+              <p:spPr>
+                <a:xfrm>
+                  <a:off x="1105489" y="3040819"/>
+                  <a:ext cx="35280" cy="225360"/>
+                </a:xfrm>
+                <a:prstGeom prst="rect">
+                  <a:avLst/>
+                </a:prstGeom>
+              </p:spPr>
+            </p:pic>
+          </mc:Fallback>
+        </mc:AlternateContent>
+        <mc:AlternateContent xmlns:mc="http://schemas.openxmlformats.org/markup-compatibility/2006">
+          <mc:Choice xmlns:p14="http://schemas.microsoft.com/office/powerpoint/2010/main" Requires="p14">
+            <p:contentPart p14:bwMode="auto" r:id="rId36">
+              <p14:nvContentPartPr>
+                <p14:cNvPr id="24" name="Ink 23">
+                  <a:extLst>
+                    <a:ext uri="{FF2B5EF4-FFF2-40B4-BE49-F238E27FC236}">
+                      <a16:creationId xmlns:a16="http://schemas.microsoft.com/office/drawing/2014/main" id="{8EEBF779-6373-42CA-9BBE-CAF8A6A08288}"/>
+                    </a:ext>
+                  </a:extLst>
+                </p14:cNvPr>
+                <p14:cNvContentPartPr/>
+                <p14:nvPr/>
+              </p14:nvContentPartPr>
+              <p14:xfrm>
+                <a:off x="1073089" y="2997979"/>
+                <a:ext cx="132480" cy="115560"/>
+              </p14:xfrm>
+            </p:contentPart>
+          </mc:Choice>
+          <mc:Fallback>
+            <p:pic>
+              <p:nvPicPr>
+                <p:cNvPr id="24" name="Ink 23">
+                  <a:extLst>
+                    <a:ext uri="{FF2B5EF4-FFF2-40B4-BE49-F238E27FC236}">
+                      <a16:creationId xmlns:a16="http://schemas.microsoft.com/office/drawing/2014/main" id="{8EEBF779-6373-42CA-9BBE-CAF8A6A08288}"/>
+                    </a:ext>
+                  </a:extLst>
+                </p:cNvPr>
+                <p:cNvPicPr/>
+                <p:nvPr/>
+              </p:nvPicPr>
+              <p:blipFill>
+                <a:blip r:embed="rId37"/>
+                <a:stretch>
+                  <a:fillRect/>
+                </a:stretch>
+              </p:blipFill>
+              <p:spPr>
+                <a:xfrm>
+                  <a:off x="1064449" y="2988979"/>
+                  <a:ext cx="150120" cy="133200"/>
+                </a:xfrm>
+                <a:prstGeom prst="rect">
+                  <a:avLst/>
+                </a:prstGeom>
+              </p:spPr>
+            </p:pic>
+          </mc:Fallback>
+        </mc:AlternateContent>
+      </p:grpSp>
+      <mc:AlternateContent xmlns:mc="http://schemas.openxmlformats.org/markup-compatibility/2006">
+        <mc:Choice xmlns:p14="http://schemas.microsoft.com/office/powerpoint/2010/main" Requires="p14">
+          <p:contentPart p14:bwMode="auto" r:id="rId38">
+            <p14:nvContentPartPr>
+              <p14:cNvPr id="26" name="Ink 25">
+                <a:extLst>
+                  <a:ext uri="{FF2B5EF4-FFF2-40B4-BE49-F238E27FC236}">
+                    <a16:creationId xmlns:a16="http://schemas.microsoft.com/office/drawing/2014/main" id="{F6AF2206-5283-4B1A-88FC-810045E7860E}"/>
+                  </a:ext>
+                </a:extLst>
+              </p14:cNvPr>
+              <p14:cNvContentPartPr/>
+              <p14:nvPr/>
+            </p14:nvContentPartPr>
+            <p14:xfrm>
+              <a:off x="4298689" y="3014899"/>
+              <a:ext cx="392040" cy="37440"/>
+            </p14:xfrm>
+          </p:contentPart>
+        </mc:Choice>
+        <mc:Fallback>
+          <p:pic>
+            <p:nvPicPr>
+              <p:cNvPr id="26" name="Ink 25">
+                <a:extLst>
+                  <a:ext uri="{FF2B5EF4-FFF2-40B4-BE49-F238E27FC236}">
+                    <a16:creationId xmlns:a16="http://schemas.microsoft.com/office/drawing/2014/main" id="{F6AF2206-5283-4B1A-88FC-810045E7860E}"/>
+                  </a:ext>
+                </a:extLst>
+              </p:cNvPr>
+              <p:cNvPicPr/>
+              <p:nvPr/>
+            </p:nvPicPr>
+            <p:blipFill>
+              <a:blip r:embed="rId39"/>
+              <a:stretch>
+                <a:fillRect/>
+              </a:stretch>
+            </p:blipFill>
+            <p:spPr>
+              <a:xfrm>
+                <a:off x="4290049" y="3005899"/>
+                <a:ext cx="409680" cy="55080"/>
+              </a:xfrm>
+              <a:prstGeom prst="rect">
+                <a:avLst/>
+              </a:prstGeom>
+            </p:spPr>
+          </p:pic>
+        </mc:Fallback>
+      </mc:AlternateContent>
     </p:spTree>
     <p:extLst>
       <p:ext uri="{BB962C8B-B14F-4D97-AF65-F5344CB8AC3E}">

</xml_diff>